<commit_message>
TD Tri - Trià bulles
</commit_message>
<xml_diff>
--- a/TP/06_AlgorithmesTri/png/Figures.pptx
+++ b/TP/06_AlgorithmesTri/png/Figures.pptx
@@ -6,6 +6,7 @@
   </p:sldMasterIdLst>
   <p:sldIdLst>
     <p:sldId id="256" r:id="rId2"/>
+    <p:sldId id="257" r:id="rId3"/>
   </p:sldIdLst>
   <p:sldSz cx="9144000" cy="6858000" type="screen4x3"/>
   <p:notesSz cx="6858000" cy="9144000"/>
@@ -288,7 +289,7 @@
           <a:p>
             <a:fld id="{AA309A6D-C09C-4548-B29A-6CF363A7E532}" type="datetimeFigureOut">
               <a:rPr lang="fr-FR" smtClean="0"/>
-              <a:t>06/11/2013</a:t>
+              <a:t>07/11/2013</a:t>
             </a:fld>
             <a:endParaRPr lang="fr-BE"/>
           </a:p>
@@ -453,7 +454,7 @@
           <a:p>
             <a:fld id="{AA309A6D-C09C-4548-B29A-6CF363A7E532}" type="datetimeFigureOut">
               <a:rPr lang="fr-FR" smtClean="0"/>
-              <a:t>06/11/2013</a:t>
+              <a:t>07/11/2013</a:t>
             </a:fld>
             <a:endParaRPr lang="fr-BE"/>
           </a:p>
@@ -628,7 +629,7 @@
           <a:p>
             <a:fld id="{AA309A6D-C09C-4548-B29A-6CF363A7E532}" type="datetimeFigureOut">
               <a:rPr lang="fr-FR" smtClean="0"/>
-              <a:t>06/11/2013</a:t>
+              <a:t>07/11/2013</a:t>
             </a:fld>
             <a:endParaRPr lang="fr-BE"/>
           </a:p>
@@ -793,7 +794,7 @@
           <a:p>
             <a:fld id="{AA309A6D-C09C-4548-B29A-6CF363A7E532}" type="datetimeFigureOut">
               <a:rPr lang="fr-FR" smtClean="0"/>
-              <a:t>06/11/2013</a:t>
+              <a:t>07/11/2013</a:t>
             </a:fld>
             <a:endParaRPr lang="fr-BE"/>
           </a:p>
@@ -1034,7 +1035,7 @@
           <a:p>
             <a:fld id="{AA309A6D-C09C-4548-B29A-6CF363A7E532}" type="datetimeFigureOut">
               <a:rPr lang="fr-FR" smtClean="0"/>
-              <a:t>06/11/2013</a:t>
+              <a:t>07/11/2013</a:t>
             </a:fld>
             <a:endParaRPr lang="fr-BE"/>
           </a:p>
@@ -1317,7 +1318,7 @@
           <a:p>
             <a:fld id="{AA309A6D-C09C-4548-B29A-6CF363A7E532}" type="datetimeFigureOut">
               <a:rPr lang="fr-FR" smtClean="0"/>
-              <a:t>06/11/2013</a:t>
+              <a:t>07/11/2013</a:t>
             </a:fld>
             <a:endParaRPr lang="fr-BE"/>
           </a:p>
@@ -1734,7 +1735,7 @@
           <a:p>
             <a:fld id="{AA309A6D-C09C-4548-B29A-6CF363A7E532}" type="datetimeFigureOut">
               <a:rPr lang="fr-FR" smtClean="0"/>
-              <a:t>06/11/2013</a:t>
+              <a:t>07/11/2013</a:t>
             </a:fld>
             <a:endParaRPr lang="fr-BE"/>
           </a:p>
@@ -1847,7 +1848,7 @@
           <a:p>
             <a:fld id="{AA309A6D-C09C-4548-B29A-6CF363A7E532}" type="datetimeFigureOut">
               <a:rPr lang="fr-FR" smtClean="0"/>
-              <a:t>06/11/2013</a:t>
+              <a:t>07/11/2013</a:t>
             </a:fld>
             <a:endParaRPr lang="fr-BE"/>
           </a:p>
@@ -1937,7 +1938,7 @@
           <a:p>
             <a:fld id="{AA309A6D-C09C-4548-B29A-6CF363A7E532}" type="datetimeFigureOut">
               <a:rPr lang="fr-FR" smtClean="0"/>
-              <a:t>06/11/2013</a:t>
+              <a:t>07/11/2013</a:t>
             </a:fld>
             <a:endParaRPr lang="fr-BE"/>
           </a:p>
@@ -2209,7 +2210,7 @@
           <a:p>
             <a:fld id="{AA309A6D-C09C-4548-B29A-6CF363A7E532}" type="datetimeFigureOut">
               <a:rPr lang="fr-FR" smtClean="0"/>
-              <a:t>06/11/2013</a:t>
+              <a:t>07/11/2013</a:t>
             </a:fld>
             <a:endParaRPr lang="fr-BE"/>
           </a:p>
@@ -2457,7 +2458,7 @@
           <a:p>
             <a:fld id="{AA309A6D-C09C-4548-B29A-6CF363A7E532}" type="datetimeFigureOut">
               <a:rPr lang="fr-FR" smtClean="0"/>
-              <a:t>06/11/2013</a:t>
+              <a:t>07/11/2013</a:t>
             </a:fld>
             <a:endParaRPr lang="fr-BE"/>
           </a:p>
@@ -2665,7 +2666,7 @@
           <a:p>
             <a:fld id="{AA309A6D-C09C-4548-B29A-6CF363A7E532}" type="datetimeFigureOut">
               <a:rPr lang="fr-FR" smtClean="0"/>
-              <a:t>06/11/2013</a:t>
+              <a:t>07/11/2013</a:t>
             </a:fld>
             <a:endParaRPr lang="fr-BE"/>
           </a:p>
@@ -5734,7 +5735,7 @@
           <p:nvPr>
             <p:extLst>
               <p:ext uri="{D42A27DB-BD31-4B8C-83A1-F6EECF244321}">
-                <p14:modId xmlns:p14="http://schemas.microsoft.com/office/powerpoint/2010/main" val="2498356325"/>
+                <p14:modId xmlns:p14="http://schemas.microsoft.com/office/powerpoint/2010/main" val="1237013370"/>
               </p:ext>
             </p:extLst>
           </p:nvPr>
@@ -5934,7 +5935,11 @@
                       <a:headEnd type="none" w="med" len="med"/>
                       <a:tailEnd type="none" w="med" len="med"/>
                     </a:lnB>
-                    <a:noFill/>
+                    <a:solidFill>
+                      <a:schemeClr val="bg1">
+                        <a:lumMod val="85000"/>
+                      </a:schemeClr>
+                    </a:solidFill>
                   </a:tcPr>
                 </a:tc>
               </a:tr>
@@ -6083,7 +6088,7 @@
           <p:nvPr>
             <p:extLst>
               <p:ext uri="{D42A27DB-BD31-4B8C-83A1-F6EECF244321}">
-                <p14:modId xmlns:p14="http://schemas.microsoft.com/office/powerpoint/2010/main" val="3083711573"/>
+                <p14:modId xmlns:p14="http://schemas.microsoft.com/office/powerpoint/2010/main" val="564878782"/>
               </p:ext>
             </p:extLst>
           </p:nvPr>
@@ -6221,7 +6226,11 @@
                       <a:headEnd type="none" w="med" len="med"/>
                       <a:tailEnd type="none" w="med" len="med"/>
                     </a:lnB>
-                    <a:noFill/>
+                    <a:solidFill>
+                      <a:schemeClr val="bg1">
+                        <a:lumMod val="85000"/>
+                      </a:schemeClr>
+                    </a:solidFill>
                   </a:tcPr>
                 </a:tc>
               </a:tr>
@@ -6436,7 +6445,7 @@
           <p:nvPr>
             <p:extLst>
               <p:ext uri="{D42A27DB-BD31-4B8C-83A1-F6EECF244321}">
-                <p14:modId xmlns:p14="http://schemas.microsoft.com/office/powerpoint/2010/main" val="2779816958"/>
+                <p14:modId xmlns:p14="http://schemas.microsoft.com/office/powerpoint/2010/main" val="2114734606"/>
               </p:ext>
             </p:extLst>
           </p:nvPr>
@@ -6512,7 +6521,11 @@
                       <a:headEnd type="none" w="med" len="med"/>
                       <a:tailEnd type="none" w="med" len="med"/>
                     </a:lnB>
-                    <a:noFill/>
+                    <a:solidFill>
+                      <a:schemeClr val="bg1">
+                        <a:lumMod val="85000"/>
+                      </a:schemeClr>
+                    </a:solidFill>
                   </a:tcPr>
                 </a:tc>
               </a:tr>
@@ -8559,10 +8572,2742 @@
           </a:fontRef>
         </p:style>
       </p:cxnSp>
+      <p:cxnSp>
+        <p:nvCxnSpPr>
+          <p:cNvPr id="127" name="Connecteur droit 126"/>
+          <p:cNvCxnSpPr/>
+          <p:nvPr/>
+        </p:nvCxnSpPr>
+        <p:spPr>
+          <a:xfrm flipV="1">
+            <a:off x="1034000" y="2204864"/>
+            <a:ext cx="0" cy="1296144"/>
+          </a:xfrm>
+          <a:prstGeom prst="line">
+            <a:avLst/>
+          </a:prstGeom>
+          <a:ln w="19050">
+            <a:solidFill>
+              <a:srgbClr val="002060"/>
+            </a:solidFill>
+            <a:tailEnd type="stealth" w="med" len="lg"/>
+          </a:ln>
+        </p:spPr>
+        <p:style>
+          <a:lnRef idx="1">
+            <a:schemeClr val="accent1"/>
+          </a:lnRef>
+          <a:fillRef idx="0">
+            <a:schemeClr val="accent1"/>
+          </a:fillRef>
+          <a:effectRef idx="0">
+            <a:schemeClr val="accent1"/>
+          </a:effectRef>
+          <a:fontRef idx="minor">
+            <a:schemeClr val="tx1"/>
+          </a:fontRef>
+        </p:style>
+      </p:cxnSp>
+      <p:sp>
+        <p:nvSpPr>
+          <p:cNvPr id="3" name="ZoneTexte 2"/>
+          <p:cNvSpPr txBox="1"/>
+          <p:nvPr/>
+        </p:nvSpPr>
+        <p:spPr>
+          <a:xfrm rot="16200000">
+            <a:off x="275350" y="2737520"/>
+            <a:ext cx="1296144" cy="230832"/>
+          </a:xfrm>
+          <a:prstGeom prst="rect">
+            <a:avLst/>
+          </a:prstGeom>
+          <a:noFill/>
+        </p:spPr>
+        <p:txBody>
+          <a:bodyPr wrap="square" rtlCol="0">
+            <a:spAutoFit/>
+          </a:bodyPr>
+          <a:lstStyle/>
+          <a:p>
+            <a:pPr algn="ctr"/>
+            <a:r>
+              <a:rPr lang="fr-FR" sz="900" dirty="0" smtClean="0"/>
+              <a:t>Sens croissant</a:t>
+            </a:r>
+            <a:endParaRPr lang="fr-FR" sz="900" dirty="0"/>
+          </a:p>
+        </p:txBody>
+      </p:sp>
     </p:spTree>
     <p:extLst>
       <p:ext uri="{BB962C8B-B14F-4D97-AF65-F5344CB8AC3E}">
         <p14:creationId xmlns:p14="http://schemas.microsoft.com/office/powerpoint/2010/main" val="2912703263"/>
+      </p:ext>
+    </p:extLst>
+  </p:cSld>
+  <p:clrMapOvr>
+    <a:masterClrMapping/>
+  </p:clrMapOvr>
+</p:sld>
+</file>
+
+<file path=ppt/slides/slide2.xml><?xml version="1.0" encoding="utf-8"?>
+<p:sld xmlns:a="http://schemas.openxmlformats.org/drawingml/2006/main" xmlns:r="http://schemas.openxmlformats.org/officeDocument/2006/relationships" xmlns:p="http://schemas.openxmlformats.org/presentationml/2006/main">
+  <p:cSld>
+    <p:spTree>
+      <p:nvGrpSpPr>
+        <p:cNvPr id="1" name=""/>
+        <p:cNvGrpSpPr/>
+        <p:nvPr/>
+      </p:nvGrpSpPr>
+      <p:grpSpPr>
+        <a:xfrm>
+          <a:off x="0" y="0"/>
+          <a:ext cx="0" cy="0"/>
+          <a:chOff x="0" y="0"/>
+          <a:chExt cx="0" cy="0"/>
+        </a:xfrm>
+      </p:grpSpPr>
+      <p:sp>
+        <p:nvSpPr>
+          <p:cNvPr id="138" name="Rectangle 137"/>
+          <p:cNvSpPr/>
+          <p:nvPr/>
+        </p:nvSpPr>
+        <p:spPr>
+          <a:xfrm rot="16200000">
+            <a:off x="5392490" y="2139788"/>
+            <a:ext cx="583569" cy="572768"/>
+          </a:xfrm>
+          <a:prstGeom prst="rect">
+            <a:avLst/>
+          </a:prstGeom>
+        </p:spPr>
+        <p:style>
+          <a:lnRef idx="1">
+            <a:schemeClr val="accent1"/>
+          </a:lnRef>
+          <a:fillRef idx="2">
+            <a:schemeClr val="accent1"/>
+          </a:fillRef>
+          <a:effectRef idx="1">
+            <a:schemeClr val="accent1"/>
+          </a:effectRef>
+          <a:fontRef idx="minor">
+            <a:schemeClr val="dk1"/>
+          </a:fontRef>
+        </p:style>
+        <p:txBody>
+          <a:bodyPr rtlCol="0" anchor="t"/>
+          <a:lstStyle/>
+          <a:p>
+            <a:pPr algn="ctr"/>
+            <a:r>
+              <a:rPr lang="fr-FR" sz="800" dirty="0" smtClean="0"/>
+              <a:t>Zone de tri</a:t>
+            </a:r>
+            <a:endParaRPr lang="fr-FR" sz="800" dirty="0"/>
+          </a:p>
+        </p:txBody>
+      </p:sp>
+      <p:sp>
+        <p:nvSpPr>
+          <p:cNvPr id="136" name="Rectangle 135"/>
+          <p:cNvSpPr/>
+          <p:nvPr/>
+        </p:nvSpPr>
+        <p:spPr>
+          <a:xfrm rot="16200000">
+            <a:off x="3834291" y="2279629"/>
+            <a:ext cx="863251" cy="572768"/>
+          </a:xfrm>
+          <a:prstGeom prst="rect">
+            <a:avLst/>
+          </a:prstGeom>
+        </p:spPr>
+        <p:style>
+          <a:lnRef idx="1">
+            <a:schemeClr val="accent1"/>
+          </a:lnRef>
+          <a:fillRef idx="2">
+            <a:schemeClr val="accent1"/>
+          </a:fillRef>
+          <a:effectRef idx="1">
+            <a:schemeClr val="accent1"/>
+          </a:effectRef>
+          <a:fontRef idx="minor">
+            <a:schemeClr val="dk1"/>
+          </a:fontRef>
+        </p:style>
+        <p:txBody>
+          <a:bodyPr rtlCol="0" anchor="t"/>
+          <a:lstStyle/>
+          <a:p>
+            <a:pPr algn="ctr"/>
+            <a:r>
+              <a:rPr lang="fr-FR" sz="900" dirty="0" smtClean="0"/>
+              <a:t>Zone de tri</a:t>
+            </a:r>
+            <a:endParaRPr lang="fr-FR" sz="900" dirty="0"/>
+          </a:p>
+        </p:txBody>
+      </p:sp>
+      <p:sp>
+        <p:nvSpPr>
+          <p:cNvPr id="135" name="Rectangle 134"/>
+          <p:cNvSpPr/>
+          <p:nvPr/>
+        </p:nvSpPr>
+        <p:spPr>
+          <a:xfrm rot="16200000">
+            <a:off x="2278568" y="2411138"/>
+            <a:ext cx="1144781" cy="572768"/>
+          </a:xfrm>
+          <a:prstGeom prst="rect">
+            <a:avLst/>
+          </a:prstGeom>
+        </p:spPr>
+        <p:style>
+          <a:lnRef idx="1">
+            <a:schemeClr val="accent1"/>
+          </a:lnRef>
+          <a:fillRef idx="2">
+            <a:schemeClr val="accent1"/>
+          </a:fillRef>
+          <a:effectRef idx="1">
+            <a:schemeClr val="accent1"/>
+          </a:effectRef>
+          <a:fontRef idx="minor">
+            <a:schemeClr val="dk1"/>
+          </a:fontRef>
+        </p:style>
+        <p:txBody>
+          <a:bodyPr rtlCol="0" anchor="t"/>
+          <a:lstStyle/>
+          <a:p>
+            <a:pPr algn="ctr"/>
+            <a:r>
+              <a:rPr lang="fr-FR" sz="900" dirty="0" smtClean="0"/>
+              <a:t>Zone de tri</a:t>
+            </a:r>
+            <a:endParaRPr lang="fr-FR" sz="900" dirty="0"/>
+          </a:p>
+        </p:txBody>
+      </p:sp>
+      <p:sp>
+        <p:nvSpPr>
+          <p:cNvPr id="2" name="Rectangle 1"/>
+          <p:cNvSpPr/>
+          <p:nvPr/>
+        </p:nvSpPr>
+        <p:spPr>
+          <a:xfrm rot="16200000">
+            <a:off x="749499" y="2558827"/>
+            <a:ext cx="1455611" cy="572768"/>
+          </a:xfrm>
+          <a:prstGeom prst="rect">
+            <a:avLst/>
+          </a:prstGeom>
+        </p:spPr>
+        <p:style>
+          <a:lnRef idx="1">
+            <a:schemeClr val="accent1"/>
+          </a:lnRef>
+          <a:fillRef idx="2">
+            <a:schemeClr val="accent1"/>
+          </a:fillRef>
+          <a:effectRef idx="1">
+            <a:schemeClr val="accent1"/>
+          </a:effectRef>
+          <a:fontRef idx="minor">
+            <a:schemeClr val="dk1"/>
+          </a:fontRef>
+        </p:style>
+        <p:txBody>
+          <a:bodyPr rtlCol="0" anchor="t"/>
+          <a:lstStyle/>
+          <a:p>
+            <a:pPr algn="ctr"/>
+            <a:r>
+              <a:rPr lang="fr-FR" sz="900" dirty="0" smtClean="0"/>
+              <a:t>Zone de tri</a:t>
+            </a:r>
+            <a:endParaRPr lang="fr-FR" sz="900" dirty="0"/>
+          </a:p>
+        </p:txBody>
+      </p:sp>
+      <p:graphicFrame>
+        <p:nvGraphicFramePr>
+          <p:cNvPr id="119" name="Tableau 118"/>
+          <p:cNvGraphicFramePr>
+            <a:graphicFrameLocks noGrp="1"/>
+          </p:cNvGraphicFramePr>
+          <p:nvPr>
+            <p:extLst>
+              <p:ext uri="{D42A27DB-BD31-4B8C-83A1-F6EECF244321}">
+                <p14:modId xmlns:p14="http://schemas.microsoft.com/office/powerpoint/2010/main" val="682894336"/>
+              </p:ext>
+            </p:extLst>
+          </p:nvPr>
+        </p:nvGraphicFramePr>
+        <p:xfrm>
+          <a:off x="1417800" y="2168860"/>
+          <a:ext cx="257200" cy="1371600"/>
+        </p:xfrm>
+        <a:graphic>
+          <a:graphicData uri="http://schemas.openxmlformats.org/drawingml/2006/table">
+            <a:tbl>
+              <a:tblPr firstRow="1" bandRow="1">
+                <a:tableStyleId>{5C22544A-7EE6-4342-B048-85BDC9FD1C3A}</a:tableStyleId>
+              </a:tblPr>
+              <a:tblGrid>
+                <a:gridCol w="257200"/>
+              </a:tblGrid>
+              <a:tr h="262384">
+                <a:tc>
+                  <a:txBody>
+                    <a:bodyPr/>
+                    <a:lstStyle/>
+                    <a:p>
+                      <a:r>
+                        <a:rPr lang="fr-FR" sz="1200" b="0" dirty="0" smtClean="0">
+                          <a:solidFill>
+                            <a:schemeClr val="tx1"/>
+                          </a:solidFill>
+                        </a:rPr>
+                        <a:t>2</a:t>
+                      </a:r>
+                      <a:endParaRPr lang="fr-FR" sz="1200" b="0" dirty="0">
+                        <a:solidFill>
+                          <a:schemeClr val="tx1"/>
+                        </a:solidFill>
+                      </a:endParaRPr>
+                    </a:p>
+                  </a:txBody>
+                  <a:tcPr anchor="ctr">
+                    <a:lnL w="12700" cap="flat" cmpd="sng" algn="ctr">
+                      <a:solidFill>
+                        <a:schemeClr val="tx1"/>
+                      </a:solidFill>
+                      <a:prstDash val="solid"/>
+                      <a:round/>
+                      <a:headEnd type="none" w="med" len="med"/>
+                      <a:tailEnd type="none" w="med" len="med"/>
+                    </a:lnL>
+                    <a:lnR w="12700" cap="flat" cmpd="sng" algn="ctr">
+                      <a:solidFill>
+                        <a:schemeClr val="tx1"/>
+                      </a:solidFill>
+                      <a:prstDash val="solid"/>
+                      <a:round/>
+                      <a:headEnd type="none" w="med" len="med"/>
+                      <a:tailEnd type="none" w="med" len="med"/>
+                    </a:lnR>
+                    <a:lnT w="12700" cap="flat" cmpd="sng" algn="ctr">
+                      <a:solidFill>
+                        <a:schemeClr val="tx1"/>
+                      </a:solidFill>
+                      <a:prstDash val="solid"/>
+                      <a:round/>
+                      <a:headEnd type="none" w="med" len="med"/>
+                      <a:tailEnd type="none" w="med" len="med"/>
+                    </a:lnT>
+                    <a:lnB w="12700" cap="flat" cmpd="sng" algn="ctr">
+                      <a:solidFill>
+                        <a:schemeClr val="tx1"/>
+                      </a:solidFill>
+                      <a:prstDash val="solid"/>
+                      <a:round/>
+                      <a:headEnd type="none" w="med" len="med"/>
+                      <a:tailEnd type="none" w="med" len="med"/>
+                    </a:lnB>
+                    <a:noFill/>
+                  </a:tcPr>
+                </a:tc>
+              </a:tr>
+              <a:tr h="262384">
+                <a:tc>
+                  <a:txBody>
+                    <a:bodyPr/>
+                    <a:lstStyle/>
+                    <a:p>
+                      <a:r>
+                        <a:rPr lang="fr-FR" sz="1200" b="0" dirty="0" smtClean="0">
+                          <a:solidFill>
+                            <a:schemeClr val="tx1"/>
+                          </a:solidFill>
+                        </a:rPr>
+                        <a:t>1</a:t>
+                      </a:r>
+                      <a:endParaRPr lang="fr-FR" sz="1200" b="0" dirty="0">
+                        <a:solidFill>
+                          <a:schemeClr val="tx1"/>
+                        </a:solidFill>
+                      </a:endParaRPr>
+                    </a:p>
+                  </a:txBody>
+                  <a:tcPr anchor="ctr">
+                    <a:lnL w="12700" cap="flat" cmpd="sng" algn="ctr">
+                      <a:solidFill>
+                        <a:schemeClr val="tx1"/>
+                      </a:solidFill>
+                      <a:prstDash val="solid"/>
+                      <a:round/>
+                      <a:headEnd type="none" w="med" len="med"/>
+                      <a:tailEnd type="none" w="med" len="med"/>
+                    </a:lnL>
+                    <a:lnR w="12700" cap="flat" cmpd="sng" algn="ctr">
+                      <a:solidFill>
+                        <a:schemeClr val="tx1"/>
+                      </a:solidFill>
+                      <a:prstDash val="solid"/>
+                      <a:round/>
+                      <a:headEnd type="none" w="med" len="med"/>
+                      <a:tailEnd type="none" w="med" len="med"/>
+                    </a:lnR>
+                    <a:lnT w="12700" cap="flat" cmpd="sng" algn="ctr">
+                      <a:solidFill>
+                        <a:schemeClr val="tx1"/>
+                      </a:solidFill>
+                      <a:prstDash val="solid"/>
+                      <a:round/>
+                      <a:headEnd type="none" w="med" len="med"/>
+                      <a:tailEnd type="none" w="med" len="med"/>
+                    </a:lnT>
+                    <a:lnB w="12700" cap="flat" cmpd="sng" algn="ctr">
+                      <a:solidFill>
+                        <a:schemeClr val="tx1"/>
+                      </a:solidFill>
+                      <a:prstDash val="solid"/>
+                      <a:round/>
+                      <a:headEnd type="none" w="med" len="med"/>
+                      <a:tailEnd type="none" w="med" len="med"/>
+                    </a:lnB>
+                    <a:solidFill>
+                      <a:schemeClr val="bg1">
+                        <a:lumMod val="85000"/>
+                      </a:schemeClr>
+                    </a:solidFill>
+                  </a:tcPr>
+                </a:tc>
+              </a:tr>
+              <a:tr h="262384">
+                <a:tc>
+                  <a:txBody>
+                    <a:bodyPr/>
+                    <a:lstStyle/>
+                    <a:p>
+                      <a:r>
+                        <a:rPr lang="fr-FR" sz="1200" b="0" dirty="0" smtClean="0">
+                          <a:solidFill>
+                            <a:schemeClr val="tx1"/>
+                          </a:solidFill>
+                        </a:rPr>
+                        <a:t>3</a:t>
+                      </a:r>
+                      <a:endParaRPr lang="fr-FR" sz="1200" b="0" dirty="0">
+                        <a:solidFill>
+                          <a:schemeClr val="tx1"/>
+                        </a:solidFill>
+                      </a:endParaRPr>
+                    </a:p>
+                  </a:txBody>
+                  <a:tcPr anchor="ctr">
+                    <a:lnL w="12700" cap="flat" cmpd="sng" algn="ctr">
+                      <a:solidFill>
+                        <a:schemeClr val="tx1"/>
+                      </a:solidFill>
+                      <a:prstDash val="solid"/>
+                      <a:round/>
+                      <a:headEnd type="none" w="med" len="med"/>
+                      <a:tailEnd type="none" w="med" len="med"/>
+                    </a:lnL>
+                    <a:lnR w="12700" cap="flat" cmpd="sng" algn="ctr">
+                      <a:solidFill>
+                        <a:schemeClr val="tx1"/>
+                      </a:solidFill>
+                      <a:prstDash val="solid"/>
+                      <a:round/>
+                      <a:headEnd type="none" w="med" len="med"/>
+                      <a:tailEnd type="none" w="med" len="med"/>
+                    </a:lnR>
+                    <a:lnT w="12700" cap="flat" cmpd="sng" algn="ctr">
+                      <a:solidFill>
+                        <a:schemeClr val="tx1"/>
+                      </a:solidFill>
+                      <a:prstDash val="solid"/>
+                      <a:round/>
+                      <a:headEnd type="none" w="med" len="med"/>
+                      <a:tailEnd type="none" w="med" len="med"/>
+                    </a:lnT>
+                    <a:lnB w="12700" cap="flat" cmpd="sng" algn="ctr">
+                      <a:solidFill>
+                        <a:schemeClr val="tx1"/>
+                      </a:solidFill>
+                      <a:prstDash val="solid"/>
+                      <a:round/>
+                      <a:headEnd type="none" w="med" len="med"/>
+                      <a:tailEnd type="none" w="med" len="med"/>
+                    </a:lnB>
+                    <a:noFill/>
+                  </a:tcPr>
+                </a:tc>
+              </a:tr>
+              <a:tr h="262384">
+                <a:tc>
+                  <a:txBody>
+                    <a:bodyPr/>
+                    <a:lstStyle/>
+                    <a:p>
+                      <a:r>
+                        <a:rPr lang="fr-FR" sz="1200" b="0" dirty="0" smtClean="0">
+                          <a:solidFill>
+                            <a:schemeClr val="tx1"/>
+                          </a:solidFill>
+                        </a:rPr>
+                        <a:t>7</a:t>
+                      </a:r>
+                      <a:endParaRPr lang="fr-FR" sz="1200" b="0" dirty="0">
+                        <a:solidFill>
+                          <a:schemeClr val="tx1"/>
+                        </a:solidFill>
+                      </a:endParaRPr>
+                    </a:p>
+                  </a:txBody>
+                  <a:tcPr anchor="ctr">
+                    <a:lnL w="12700" cap="flat" cmpd="sng" algn="ctr">
+                      <a:solidFill>
+                        <a:schemeClr val="tx1"/>
+                      </a:solidFill>
+                      <a:prstDash val="solid"/>
+                      <a:round/>
+                      <a:headEnd type="none" w="med" len="med"/>
+                      <a:tailEnd type="none" w="med" len="med"/>
+                    </a:lnL>
+                    <a:lnR w="12700" cap="flat" cmpd="sng" algn="ctr">
+                      <a:solidFill>
+                        <a:schemeClr val="tx1"/>
+                      </a:solidFill>
+                      <a:prstDash val="solid"/>
+                      <a:round/>
+                      <a:headEnd type="none" w="med" len="med"/>
+                      <a:tailEnd type="none" w="med" len="med"/>
+                    </a:lnR>
+                    <a:lnT w="12700" cap="flat" cmpd="sng" algn="ctr">
+                      <a:solidFill>
+                        <a:schemeClr val="tx1"/>
+                      </a:solidFill>
+                      <a:prstDash val="solid"/>
+                      <a:round/>
+                      <a:headEnd type="none" w="med" len="med"/>
+                      <a:tailEnd type="none" w="med" len="med"/>
+                    </a:lnT>
+                    <a:lnB w="12700" cap="flat" cmpd="sng" algn="ctr">
+                      <a:solidFill>
+                        <a:schemeClr val="tx1"/>
+                      </a:solidFill>
+                      <a:prstDash val="solid"/>
+                      <a:round/>
+                      <a:headEnd type="none" w="med" len="med"/>
+                      <a:tailEnd type="none" w="med" len="med"/>
+                    </a:lnB>
+                    <a:noFill/>
+                  </a:tcPr>
+                </a:tc>
+              </a:tr>
+              <a:tr h="262384">
+                <a:tc>
+                  <a:txBody>
+                    <a:bodyPr/>
+                    <a:lstStyle/>
+                    <a:p>
+                      <a:r>
+                        <a:rPr lang="fr-FR" sz="1200" b="0" dirty="0" smtClean="0">
+                          <a:solidFill>
+                            <a:schemeClr val="tx1"/>
+                          </a:solidFill>
+                        </a:rPr>
+                        <a:t>9</a:t>
+                      </a:r>
+                      <a:endParaRPr lang="fr-FR" sz="1200" b="0" dirty="0">
+                        <a:solidFill>
+                          <a:schemeClr val="tx1"/>
+                        </a:solidFill>
+                      </a:endParaRPr>
+                    </a:p>
+                  </a:txBody>
+                  <a:tcPr anchor="ctr">
+                    <a:lnL w="12700" cap="flat" cmpd="sng" algn="ctr">
+                      <a:solidFill>
+                        <a:schemeClr val="tx1"/>
+                      </a:solidFill>
+                      <a:prstDash val="solid"/>
+                      <a:round/>
+                      <a:headEnd type="none" w="med" len="med"/>
+                      <a:tailEnd type="none" w="med" len="med"/>
+                    </a:lnL>
+                    <a:lnR w="12700" cap="flat" cmpd="sng" algn="ctr">
+                      <a:solidFill>
+                        <a:schemeClr val="tx1"/>
+                      </a:solidFill>
+                      <a:prstDash val="solid"/>
+                      <a:round/>
+                      <a:headEnd type="none" w="med" len="med"/>
+                      <a:tailEnd type="none" w="med" len="med"/>
+                    </a:lnR>
+                    <a:lnT w="12700" cap="flat" cmpd="sng" algn="ctr">
+                      <a:solidFill>
+                        <a:schemeClr val="tx1"/>
+                      </a:solidFill>
+                      <a:prstDash val="solid"/>
+                      <a:round/>
+                      <a:headEnd type="none" w="med" len="med"/>
+                      <a:tailEnd type="none" w="med" len="med"/>
+                    </a:lnT>
+                    <a:lnB w="12700" cap="flat" cmpd="sng" algn="ctr">
+                      <a:solidFill>
+                        <a:schemeClr val="tx1"/>
+                      </a:solidFill>
+                      <a:prstDash val="solid"/>
+                      <a:round/>
+                      <a:headEnd type="none" w="med" len="med"/>
+                      <a:tailEnd type="none" w="med" len="med"/>
+                    </a:lnB>
+                    <a:solidFill>
+                      <a:schemeClr val="bg1">
+                        <a:lumMod val="85000"/>
+                      </a:schemeClr>
+                    </a:solidFill>
+                  </a:tcPr>
+                </a:tc>
+              </a:tr>
+            </a:tbl>
+          </a:graphicData>
+        </a:graphic>
+      </p:graphicFrame>
+      <p:graphicFrame>
+        <p:nvGraphicFramePr>
+          <p:cNvPr id="120" name="Tableau 119"/>
+          <p:cNvGraphicFramePr>
+            <a:graphicFrameLocks noGrp="1"/>
+          </p:cNvGraphicFramePr>
+          <p:nvPr>
+            <p:extLst>
+              <p:ext uri="{D42A27DB-BD31-4B8C-83A1-F6EECF244321}">
+                <p14:modId xmlns:p14="http://schemas.microsoft.com/office/powerpoint/2010/main" val="4073457547"/>
+              </p:ext>
+            </p:extLst>
+          </p:nvPr>
+        </p:nvGraphicFramePr>
+        <p:xfrm>
+          <a:off x="2839958" y="2168860"/>
+          <a:ext cx="257200" cy="1371600"/>
+        </p:xfrm>
+        <a:graphic>
+          <a:graphicData uri="http://schemas.openxmlformats.org/drawingml/2006/table">
+            <a:tbl>
+              <a:tblPr firstRow="1" bandRow="1">
+                <a:tableStyleId>{5C22544A-7EE6-4342-B048-85BDC9FD1C3A}</a:tableStyleId>
+              </a:tblPr>
+              <a:tblGrid>
+                <a:gridCol w="257200"/>
+              </a:tblGrid>
+              <a:tr h="262384">
+                <a:tc>
+                  <a:txBody>
+                    <a:bodyPr/>
+                    <a:lstStyle/>
+                    <a:p>
+                      <a:r>
+                        <a:rPr lang="fr-FR" sz="1200" b="0" dirty="0" smtClean="0">
+                          <a:solidFill>
+                            <a:schemeClr val="tx1"/>
+                          </a:solidFill>
+                        </a:rPr>
+                        <a:t>2</a:t>
+                      </a:r>
+                      <a:endParaRPr lang="fr-FR" sz="1200" b="0" dirty="0">
+                        <a:solidFill>
+                          <a:schemeClr val="tx1"/>
+                        </a:solidFill>
+                      </a:endParaRPr>
+                    </a:p>
+                  </a:txBody>
+                  <a:tcPr anchor="ctr">
+                    <a:lnL w="12700" cap="flat" cmpd="sng" algn="ctr">
+                      <a:solidFill>
+                        <a:schemeClr val="tx1"/>
+                      </a:solidFill>
+                      <a:prstDash val="solid"/>
+                      <a:round/>
+                      <a:headEnd type="none" w="med" len="med"/>
+                      <a:tailEnd type="none" w="med" len="med"/>
+                    </a:lnL>
+                    <a:lnR w="12700" cap="flat" cmpd="sng" algn="ctr">
+                      <a:solidFill>
+                        <a:schemeClr val="tx1"/>
+                      </a:solidFill>
+                      <a:prstDash val="solid"/>
+                      <a:round/>
+                      <a:headEnd type="none" w="med" len="med"/>
+                      <a:tailEnd type="none" w="med" len="med"/>
+                    </a:lnR>
+                    <a:lnT w="12700" cap="flat" cmpd="sng" algn="ctr">
+                      <a:solidFill>
+                        <a:schemeClr val="tx1"/>
+                      </a:solidFill>
+                      <a:prstDash val="solid"/>
+                      <a:round/>
+                      <a:headEnd type="none" w="med" len="med"/>
+                      <a:tailEnd type="none" w="med" len="med"/>
+                    </a:lnT>
+                    <a:lnB w="12700" cap="flat" cmpd="sng" algn="ctr">
+                      <a:solidFill>
+                        <a:schemeClr val="tx1"/>
+                      </a:solidFill>
+                      <a:prstDash val="solid"/>
+                      <a:round/>
+                      <a:headEnd type="none" w="med" len="med"/>
+                      <a:tailEnd type="none" w="med" len="med"/>
+                    </a:lnB>
+                    <a:solidFill>
+                      <a:schemeClr val="bg1">
+                        <a:lumMod val="85000"/>
+                      </a:schemeClr>
+                    </a:solidFill>
+                  </a:tcPr>
+                </a:tc>
+              </a:tr>
+              <a:tr h="262384">
+                <a:tc>
+                  <a:txBody>
+                    <a:bodyPr/>
+                    <a:lstStyle/>
+                    <a:p>
+                      <a:r>
+                        <a:rPr lang="fr-FR" sz="1200" b="0" dirty="0" smtClean="0">
+                          <a:solidFill>
+                            <a:schemeClr val="tx1"/>
+                          </a:solidFill>
+                        </a:rPr>
+                        <a:t>9</a:t>
+                      </a:r>
+                      <a:endParaRPr lang="fr-FR" sz="1200" b="0" dirty="0">
+                        <a:solidFill>
+                          <a:schemeClr val="tx1"/>
+                        </a:solidFill>
+                      </a:endParaRPr>
+                    </a:p>
+                  </a:txBody>
+                  <a:tcPr anchor="ctr">
+                    <a:lnL w="12700" cap="flat" cmpd="sng" algn="ctr">
+                      <a:solidFill>
+                        <a:schemeClr val="tx1"/>
+                      </a:solidFill>
+                      <a:prstDash val="solid"/>
+                      <a:round/>
+                      <a:headEnd type="none" w="med" len="med"/>
+                      <a:tailEnd type="none" w="med" len="med"/>
+                    </a:lnL>
+                    <a:lnR w="12700" cap="flat" cmpd="sng" algn="ctr">
+                      <a:solidFill>
+                        <a:schemeClr val="tx1"/>
+                      </a:solidFill>
+                      <a:prstDash val="solid"/>
+                      <a:round/>
+                      <a:headEnd type="none" w="med" len="med"/>
+                      <a:tailEnd type="none" w="med" len="med"/>
+                    </a:lnR>
+                    <a:lnT w="12700" cap="flat" cmpd="sng" algn="ctr">
+                      <a:solidFill>
+                        <a:schemeClr val="tx1"/>
+                      </a:solidFill>
+                      <a:prstDash val="solid"/>
+                      <a:round/>
+                      <a:headEnd type="none" w="med" len="med"/>
+                      <a:tailEnd type="none" w="med" len="med"/>
+                    </a:lnT>
+                    <a:lnB w="12700" cap="flat" cmpd="sng" algn="ctr">
+                      <a:solidFill>
+                        <a:schemeClr val="tx1"/>
+                      </a:solidFill>
+                      <a:prstDash val="solid"/>
+                      <a:round/>
+                      <a:headEnd type="none" w="med" len="med"/>
+                      <a:tailEnd type="none" w="med" len="med"/>
+                    </a:lnB>
+                    <a:noFill/>
+                  </a:tcPr>
+                </a:tc>
+              </a:tr>
+              <a:tr h="262384">
+                <a:tc>
+                  <a:txBody>
+                    <a:bodyPr/>
+                    <a:lstStyle/>
+                    <a:p>
+                      <a:r>
+                        <a:rPr lang="fr-FR" sz="1200" b="0" dirty="0" smtClean="0">
+                          <a:solidFill>
+                            <a:schemeClr val="tx1"/>
+                          </a:solidFill>
+                        </a:rPr>
+                        <a:t>3</a:t>
+                      </a:r>
+                      <a:endParaRPr lang="fr-FR" sz="1200" b="0" dirty="0">
+                        <a:solidFill>
+                          <a:schemeClr val="tx1"/>
+                        </a:solidFill>
+                      </a:endParaRPr>
+                    </a:p>
+                  </a:txBody>
+                  <a:tcPr anchor="ctr">
+                    <a:lnL w="12700" cap="flat" cmpd="sng" algn="ctr">
+                      <a:solidFill>
+                        <a:schemeClr val="tx1"/>
+                      </a:solidFill>
+                      <a:prstDash val="solid"/>
+                      <a:round/>
+                      <a:headEnd type="none" w="med" len="med"/>
+                      <a:tailEnd type="none" w="med" len="med"/>
+                    </a:lnL>
+                    <a:lnR w="12700" cap="flat" cmpd="sng" algn="ctr">
+                      <a:solidFill>
+                        <a:schemeClr val="tx1"/>
+                      </a:solidFill>
+                      <a:prstDash val="solid"/>
+                      <a:round/>
+                      <a:headEnd type="none" w="med" len="med"/>
+                      <a:tailEnd type="none" w="med" len="med"/>
+                    </a:lnR>
+                    <a:lnT w="12700" cap="flat" cmpd="sng" algn="ctr">
+                      <a:solidFill>
+                        <a:schemeClr val="tx1"/>
+                      </a:solidFill>
+                      <a:prstDash val="solid"/>
+                      <a:round/>
+                      <a:headEnd type="none" w="med" len="med"/>
+                      <a:tailEnd type="none" w="med" len="med"/>
+                    </a:lnT>
+                    <a:lnB w="12700" cap="flat" cmpd="sng" algn="ctr">
+                      <a:solidFill>
+                        <a:schemeClr val="tx1"/>
+                      </a:solidFill>
+                      <a:prstDash val="solid"/>
+                      <a:round/>
+                      <a:headEnd type="none" w="med" len="med"/>
+                      <a:tailEnd type="none" w="med" len="med"/>
+                    </a:lnB>
+                    <a:noFill/>
+                  </a:tcPr>
+                </a:tc>
+              </a:tr>
+              <a:tr h="262384">
+                <a:tc>
+                  <a:txBody>
+                    <a:bodyPr/>
+                    <a:lstStyle/>
+                    <a:p>
+                      <a:r>
+                        <a:rPr lang="fr-FR" sz="1200" b="0" dirty="0" smtClean="0">
+                          <a:solidFill>
+                            <a:schemeClr val="tx1"/>
+                          </a:solidFill>
+                        </a:rPr>
+                        <a:t>7</a:t>
+                      </a:r>
+                      <a:endParaRPr lang="fr-FR" sz="1200" b="0" dirty="0">
+                        <a:solidFill>
+                          <a:schemeClr val="tx1"/>
+                        </a:solidFill>
+                      </a:endParaRPr>
+                    </a:p>
+                  </a:txBody>
+                  <a:tcPr anchor="ctr">
+                    <a:lnL w="12700" cap="flat" cmpd="sng" algn="ctr">
+                      <a:solidFill>
+                        <a:schemeClr val="tx1"/>
+                      </a:solidFill>
+                      <a:prstDash val="solid"/>
+                      <a:round/>
+                      <a:headEnd type="none" w="med" len="med"/>
+                      <a:tailEnd type="none" w="med" len="med"/>
+                    </a:lnL>
+                    <a:lnR w="12700" cap="flat" cmpd="sng" algn="ctr">
+                      <a:solidFill>
+                        <a:schemeClr val="tx1"/>
+                      </a:solidFill>
+                      <a:prstDash val="solid"/>
+                      <a:round/>
+                      <a:headEnd type="none" w="med" len="med"/>
+                      <a:tailEnd type="none" w="med" len="med"/>
+                    </a:lnR>
+                    <a:lnT w="12700" cap="flat" cmpd="sng" algn="ctr">
+                      <a:solidFill>
+                        <a:schemeClr val="tx1"/>
+                      </a:solidFill>
+                      <a:prstDash val="solid"/>
+                      <a:round/>
+                      <a:headEnd type="none" w="med" len="med"/>
+                      <a:tailEnd type="none" w="med" len="med"/>
+                    </a:lnT>
+                    <a:lnB w="12700" cap="flat" cmpd="sng" algn="ctr">
+                      <a:solidFill>
+                        <a:schemeClr val="tx1"/>
+                      </a:solidFill>
+                      <a:prstDash val="solid"/>
+                      <a:round/>
+                      <a:headEnd type="none" w="med" len="med"/>
+                      <a:tailEnd type="none" w="med" len="med"/>
+                    </a:lnB>
+                    <a:solidFill>
+                      <a:schemeClr val="bg1">
+                        <a:lumMod val="85000"/>
+                      </a:schemeClr>
+                    </a:solidFill>
+                  </a:tcPr>
+                </a:tc>
+              </a:tr>
+              <a:tr h="262384">
+                <a:tc>
+                  <a:txBody>
+                    <a:bodyPr/>
+                    <a:lstStyle/>
+                    <a:p>
+                      <a:r>
+                        <a:rPr lang="fr-FR" sz="1200" b="0" dirty="0" smtClean="0">
+                          <a:solidFill>
+                            <a:schemeClr val="tx1"/>
+                          </a:solidFill>
+                        </a:rPr>
+                        <a:t>1</a:t>
+                      </a:r>
+                      <a:endParaRPr lang="fr-FR" sz="1200" b="0" dirty="0">
+                        <a:solidFill>
+                          <a:schemeClr val="tx1"/>
+                        </a:solidFill>
+                      </a:endParaRPr>
+                    </a:p>
+                  </a:txBody>
+                  <a:tcPr anchor="ctr">
+                    <a:lnL w="12700" cap="flat" cmpd="sng" algn="ctr">
+                      <a:solidFill>
+                        <a:schemeClr val="tx1"/>
+                      </a:solidFill>
+                      <a:prstDash val="solid"/>
+                      <a:round/>
+                      <a:headEnd type="none" w="med" len="med"/>
+                      <a:tailEnd type="none" w="med" len="med"/>
+                    </a:lnL>
+                    <a:lnR w="12700" cap="flat" cmpd="sng" algn="ctr">
+                      <a:solidFill>
+                        <a:schemeClr val="tx1"/>
+                      </a:solidFill>
+                      <a:prstDash val="solid"/>
+                      <a:round/>
+                      <a:headEnd type="none" w="med" len="med"/>
+                      <a:tailEnd type="none" w="med" len="med"/>
+                    </a:lnR>
+                    <a:lnT w="12700" cap="flat" cmpd="sng" algn="ctr">
+                      <a:solidFill>
+                        <a:schemeClr val="tx1"/>
+                      </a:solidFill>
+                      <a:prstDash val="solid"/>
+                      <a:round/>
+                      <a:headEnd type="none" w="med" len="med"/>
+                      <a:tailEnd type="none" w="med" len="med"/>
+                    </a:lnT>
+                    <a:lnB w="12700" cap="flat" cmpd="sng" algn="ctr">
+                      <a:solidFill>
+                        <a:schemeClr val="tx1"/>
+                      </a:solidFill>
+                      <a:prstDash val="solid"/>
+                      <a:round/>
+                      <a:headEnd type="none" w="med" len="med"/>
+                      <a:tailEnd type="none" w="med" len="med"/>
+                    </a:lnB>
+                    <a:noFill/>
+                  </a:tcPr>
+                </a:tc>
+              </a:tr>
+            </a:tbl>
+          </a:graphicData>
+        </a:graphic>
+      </p:graphicFrame>
+      <p:graphicFrame>
+        <p:nvGraphicFramePr>
+          <p:cNvPr id="121" name="Tableau 120"/>
+          <p:cNvGraphicFramePr>
+            <a:graphicFrameLocks noGrp="1"/>
+          </p:cNvGraphicFramePr>
+          <p:nvPr>
+            <p:extLst>
+              <p:ext uri="{D42A27DB-BD31-4B8C-83A1-F6EECF244321}">
+                <p14:modId xmlns:p14="http://schemas.microsoft.com/office/powerpoint/2010/main" val="1325780915"/>
+              </p:ext>
+            </p:extLst>
+          </p:nvPr>
+        </p:nvGraphicFramePr>
+        <p:xfrm>
+          <a:off x="4262116" y="2168860"/>
+          <a:ext cx="257200" cy="1371600"/>
+        </p:xfrm>
+        <a:graphic>
+          <a:graphicData uri="http://schemas.openxmlformats.org/drawingml/2006/table">
+            <a:tbl>
+              <a:tblPr firstRow="1" bandRow="1">
+                <a:tableStyleId>{5C22544A-7EE6-4342-B048-85BDC9FD1C3A}</a:tableStyleId>
+              </a:tblPr>
+              <a:tblGrid>
+                <a:gridCol w="257200"/>
+              </a:tblGrid>
+              <a:tr h="262384">
+                <a:tc>
+                  <a:txBody>
+                    <a:bodyPr/>
+                    <a:lstStyle/>
+                    <a:p>
+                      <a:r>
+                        <a:rPr lang="fr-FR" sz="1200" b="0" dirty="0" smtClean="0">
+                          <a:solidFill>
+                            <a:schemeClr val="tx1"/>
+                          </a:solidFill>
+                        </a:rPr>
+                        <a:t>7</a:t>
+                      </a:r>
+                      <a:endParaRPr lang="fr-FR" sz="1200" b="0" dirty="0">
+                        <a:solidFill>
+                          <a:schemeClr val="tx1"/>
+                        </a:solidFill>
+                      </a:endParaRPr>
+                    </a:p>
+                  </a:txBody>
+                  <a:tcPr anchor="ctr">
+                    <a:lnL w="12700" cap="flat" cmpd="sng" algn="ctr">
+                      <a:solidFill>
+                        <a:schemeClr val="tx1"/>
+                      </a:solidFill>
+                      <a:prstDash val="solid"/>
+                      <a:round/>
+                      <a:headEnd type="none" w="med" len="med"/>
+                      <a:tailEnd type="none" w="med" len="med"/>
+                    </a:lnL>
+                    <a:lnR w="12700" cap="flat" cmpd="sng" algn="ctr">
+                      <a:solidFill>
+                        <a:schemeClr val="tx1"/>
+                      </a:solidFill>
+                      <a:prstDash val="solid"/>
+                      <a:round/>
+                      <a:headEnd type="none" w="med" len="med"/>
+                      <a:tailEnd type="none" w="med" len="med"/>
+                    </a:lnR>
+                    <a:lnT w="12700" cap="flat" cmpd="sng" algn="ctr">
+                      <a:solidFill>
+                        <a:schemeClr val="tx1"/>
+                      </a:solidFill>
+                      <a:prstDash val="solid"/>
+                      <a:round/>
+                      <a:headEnd type="none" w="med" len="med"/>
+                      <a:tailEnd type="none" w="med" len="med"/>
+                    </a:lnT>
+                    <a:lnB w="12700" cap="flat" cmpd="sng" algn="ctr">
+                      <a:solidFill>
+                        <a:schemeClr val="tx1"/>
+                      </a:solidFill>
+                      <a:prstDash val="solid"/>
+                      <a:round/>
+                      <a:headEnd type="none" w="med" len="med"/>
+                      <a:tailEnd type="none" w="med" len="med"/>
+                    </a:lnB>
+                    <a:noFill/>
+                  </a:tcPr>
+                </a:tc>
+              </a:tr>
+              <a:tr h="262384">
+                <a:tc>
+                  <a:txBody>
+                    <a:bodyPr/>
+                    <a:lstStyle/>
+                    <a:p>
+                      <a:r>
+                        <a:rPr lang="fr-FR" sz="1200" b="0" dirty="0" smtClean="0">
+                          <a:solidFill>
+                            <a:schemeClr val="tx1"/>
+                          </a:solidFill>
+                        </a:rPr>
+                        <a:t>9</a:t>
+                      </a:r>
+                      <a:endParaRPr lang="fr-FR" sz="1200" b="0" dirty="0">
+                        <a:solidFill>
+                          <a:schemeClr val="tx1"/>
+                        </a:solidFill>
+                      </a:endParaRPr>
+                    </a:p>
+                  </a:txBody>
+                  <a:tcPr anchor="ctr">
+                    <a:lnL w="12700" cap="flat" cmpd="sng" algn="ctr">
+                      <a:solidFill>
+                        <a:schemeClr val="tx1"/>
+                      </a:solidFill>
+                      <a:prstDash val="solid"/>
+                      <a:round/>
+                      <a:headEnd type="none" w="med" len="med"/>
+                      <a:tailEnd type="none" w="med" len="med"/>
+                    </a:lnL>
+                    <a:lnR w="12700" cap="flat" cmpd="sng" algn="ctr">
+                      <a:solidFill>
+                        <a:schemeClr val="tx1"/>
+                      </a:solidFill>
+                      <a:prstDash val="solid"/>
+                      <a:round/>
+                      <a:headEnd type="none" w="med" len="med"/>
+                      <a:tailEnd type="none" w="med" len="med"/>
+                    </a:lnR>
+                    <a:lnT w="12700" cap="flat" cmpd="sng" algn="ctr">
+                      <a:solidFill>
+                        <a:schemeClr val="tx1"/>
+                      </a:solidFill>
+                      <a:prstDash val="solid"/>
+                      <a:round/>
+                      <a:headEnd type="none" w="med" len="med"/>
+                      <a:tailEnd type="none" w="med" len="med"/>
+                    </a:lnT>
+                    <a:lnB w="12700" cap="flat" cmpd="sng" algn="ctr">
+                      <a:solidFill>
+                        <a:schemeClr val="tx1"/>
+                      </a:solidFill>
+                      <a:prstDash val="solid"/>
+                      <a:round/>
+                      <a:headEnd type="none" w="med" len="med"/>
+                      <a:tailEnd type="none" w="med" len="med"/>
+                    </a:lnB>
+                    <a:noFill/>
+                  </a:tcPr>
+                </a:tc>
+              </a:tr>
+              <a:tr h="262384">
+                <a:tc>
+                  <a:txBody>
+                    <a:bodyPr/>
+                    <a:lstStyle/>
+                    <a:p>
+                      <a:r>
+                        <a:rPr lang="fr-FR" sz="1200" b="0" dirty="0" smtClean="0">
+                          <a:solidFill>
+                            <a:schemeClr val="tx1"/>
+                          </a:solidFill>
+                        </a:rPr>
+                        <a:t>3</a:t>
+                      </a:r>
+                      <a:endParaRPr lang="fr-FR" sz="1200" b="0" dirty="0">
+                        <a:solidFill>
+                          <a:schemeClr val="tx1"/>
+                        </a:solidFill>
+                      </a:endParaRPr>
+                    </a:p>
+                  </a:txBody>
+                  <a:tcPr anchor="ctr">
+                    <a:lnL w="12700" cap="flat" cmpd="sng" algn="ctr">
+                      <a:solidFill>
+                        <a:schemeClr val="tx1"/>
+                      </a:solidFill>
+                      <a:prstDash val="solid"/>
+                      <a:round/>
+                      <a:headEnd type="none" w="med" len="med"/>
+                      <a:tailEnd type="none" w="med" len="med"/>
+                    </a:lnL>
+                    <a:lnR w="12700" cap="flat" cmpd="sng" algn="ctr">
+                      <a:solidFill>
+                        <a:schemeClr val="tx1"/>
+                      </a:solidFill>
+                      <a:prstDash val="solid"/>
+                      <a:round/>
+                      <a:headEnd type="none" w="med" len="med"/>
+                      <a:tailEnd type="none" w="med" len="med"/>
+                    </a:lnR>
+                    <a:lnT w="12700" cap="flat" cmpd="sng" algn="ctr">
+                      <a:solidFill>
+                        <a:schemeClr val="tx1"/>
+                      </a:solidFill>
+                      <a:prstDash val="solid"/>
+                      <a:round/>
+                      <a:headEnd type="none" w="med" len="med"/>
+                      <a:tailEnd type="none" w="med" len="med"/>
+                    </a:lnT>
+                    <a:lnB w="12700" cap="flat" cmpd="sng" algn="ctr">
+                      <a:solidFill>
+                        <a:schemeClr val="tx1"/>
+                      </a:solidFill>
+                      <a:prstDash val="solid"/>
+                      <a:round/>
+                      <a:headEnd type="none" w="med" len="med"/>
+                      <a:tailEnd type="none" w="med" len="med"/>
+                    </a:lnB>
+                    <a:solidFill>
+                      <a:schemeClr val="bg1">
+                        <a:lumMod val="85000"/>
+                      </a:schemeClr>
+                    </a:solidFill>
+                  </a:tcPr>
+                </a:tc>
+              </a:tr>
+              <a:tr h="262384">
+                <a:tc>
+                  <a:txBody>
+                    <a:bodyPr/>
+                    <a:lstStyle/>
+                    <a:p>
+                      <a:r>
+                        <a:rPr lang="fr-FR" sz="1200" b="0" dirty="0" smtClean="0">
+                          <a:solidFill>
+                            <a:schemeClr val="tx1"/>
+                          </a:solidFill>
+                        </a:rPr>
+                        <a:t>2</a:t>
+                      </a:r>
+                      <a:endParaRPr lang="fr-FR" sz="1200" b="0" dirty="0">
+                        <a:solidFill>
+                          <a:schemeClr val="tx1"/>
+                        </a:solidFill>
+                      </a:endParaRPr>
+                    </a:p>
+                  </a:txBody>
+                  <a:tcPr anchor="ctr">
+                    <a:lnL w="12700" cap="flat" cmpd="sng" algn="ctr">
+                      <a:solidFill>
+                        <a:schemeClr val="tx1"/>
+                      </a:solidFill>
+                      <a:prstDash val="solid"/>
+                      <a:round/>
+                      <a:headEnd type="none" w="med" len="med"/>
+                      <a:tailEnd type="none" w="med" len="med"/>
+                    </a:lnL>
+                    <a:lnR w="12700" cap="flat" cmpd="sng" algn="ctr">
+                      <a:solidFill>
+                        <a:schemeClr val="tx1"/>
+                      </a:solidFill>
+                      <a:prstDash val="solid"/>
+                      <a:round/>
+                      <a:headEnd type="none" w="med" len="med"/>
+                      <a:tailEnd type="none" w="med" len="med"/>
+                    </a:lnR>
+                    <a:lnT w="12700" cap="flat" cmpd="sng" algn="ctr">
+                      <a:solidFill>
+                        <a:schemeClr val="tx1"/>
+                      </a:solidFill>
+                      <a:prstDash val="solid"/>
+                      <a:round/>
+                      <a:headEnd type="none" w="med" len="med"/>
+                      <a:tailEnd type="none" w="med" len="med"/>
+                    </a:lnT>
+                    <a:lnB w="12700" cap="flat" cmpd="sng" algn="ctr">
+                      <a:solidFill>
+                        <a:schemeClr val="tx1"/>
+                      </a:solidFill>
+                      <a:prstDash val="solid"/>
+                      <a:round/>
+                      <a:headEnd type="none" w="med" len="med"/>
+                      <a:tailEnd type="none" w="med" len="med"/>
+                    </a:lnB>
+                    <a:noFill/>
+                  </a:tcPr>
+                </a:tc>
+              </a:tr>
+              <a:tr h="262384">
+                <a:tc>
+                  <a:txBody>
+                    <a:bodyPr/>
+                    <a:lstStyle/>
+                    <a:p>
+                      <a:r>
+                        <a:rPr lang="fr-FR" sz="1200" b="0" dirty="0" smtClean="0">
+                          <a:solidFill>
+                            <a:schemeClr val="tx1"/>
+                          </a:solidFill>
+                        </a:rPr>
+                        <a:t>1</a:t>
+                      </a:r>
+                      <a:endParaRPr lang="fr-FR" sz="1200" b="0" dirty="0">
+                        <a:solidFill>
+                          <a:schemeClr val="tx1"/>
+                        </a:solidFill>
+                      </a:endParaRPr>
+                    </a:p>
+                  </a:txBody>
+                  <a:tcPr anchor="ctr">
+                    <a:lnL w="12700" cap="flat" cmpd="sng" algn="ctr">
+                      <a:solidFill>
+                        <a:schemeClr val="tx1"/>
+                      </a:solidFill>
+                      <a:prstDash val="solid"/>
+                      <a:round/>
+                      <a:headEnd type="none" w="med" len="med"/>
+                      <a:tailEnd type="none" w="med" len="med"/>
+                    </a:lnL>
+                    <a:lnR w="12700" cap="flat" cmpd="sng" algn="ctr">
+                      <a:solidFill>
+                        <a:schemeClr val="tx1"/>
+                      </a:solidFill>
+                      <a:prstDash val="solid"/>
+                      <a:round/>
+                      <a:headEnd type="none" w="med" len="med"/>
+                      <a:tailEnd type="none" w="med" len="med"/>
+                    </a:lnR>
+                    <a:lnT w="12700" cap="flat" cmpd="sng" algn="ctr">
+                      <a:solidFill>
+                        <a:schemeClr val="tx1"/>
+                      </a:solidFill>
+                      <a:prstDash val="solid"/>
+                      <a:round/>
+                      <a:headEnd type="none" w="med" len="med"/>
+                      <a:tailEnd type="none" w="med" len="med"/>
+                    </a:lnT>
+                    <a:lnB w="12700" cap="flat" cmpd="sng" algn="ctr">
+                      <a:solidFill>
+                        <a:schemeClr val="tx1"/>
+                      </a:solidFill>
+                      <a:prstDash val="solid"/>
+                      <a:round/>
+                      <a:headEnd type="none" w="med" len="med"/>
+                      <a:tailEnd type="none" w="med" len="med"/>
+                    </a:lnB>
+                    <a:noFill/>
+                  </a:tcPr>
+                </a:tc>
+              </a:tr>
+            </a:tbl>
+          </a:graphicData>
+        </a:graphic>
+      </p:graphicFrame>
+      <p:graphicFrame>
+        <p:nvGraphicFramePr>
+          <p:cNvPr id="122" name="Tableau 121"/>
+          <p:cNvGraphicFramePr>
+            <a:graphicFrameLocks noGrp="1"/>
+          </p:cNvGraphicFramePr>
+          <p:nvPr>
+            <p:extLst>
+              <p:ext uri="{D42A27DB-BD31-4B8C-83A1-F6EECF244321}">
+                <p14:modId xmlns:p14="http://schemas.microsoft.com/office/powerpoint/2010/main" val="2487071813"/>
+              </p:ext>
+            </p:extLst>
+          </p:nvPr>
+        </p:nvGraphicFramePr>
+        <p:xfrm>
+          <a:off x="5684274" y="2168860"/>
+          <a:ext cx="257200" cy="1371600"/>
+        </p:xfrm>
+        <a:graphic>
+          <a:graphicData uri="http://schemas.openxmlformats.org/drawingml/2006/table">
+            <a:tbl>
+              <a:tblPr firstRow="1" bandRow="1">
+                <a:tableStyleId>{5C22544A-7EE6-4342-B048-85BDC9FD1C3A}</a:tableStyleId>
+              </a:tblPr>
+              <a:tblGrid>
+                <a:gridCol w="257200"/>
+              </a:tblGrid>
+              <a:tr h="262384">
+                <a:tc>
+                  <a:txBody>
+                    <a:bodyPr/>
+                    <a:lstStyle/>
+                    <a:p>
+                      <a:r>
+                        <a:rPr lang="fr-FR" sz="1200" b="0" dirty="0" smtClean="0">
+                          <a:solidFill>
+                            <a:schemeClr val="tx1"/>
+                          </a:solidFill>
+                        </a:rPr>
+                        <a:t>7</a:t>
+                      </a:r>
+                      <a:endParaRPr lang="fr-FR" sz="1200" b="0" dirty="0">
+                        <a:solidFill>
+                          <a:schemeClr val="tx1"/>
+                        </a:solidFill>
+                      </a:endParaRPr>
+                    </a:p>
+                  </a:txBody>
+                  <a:tcPr anchor="ctr">
+                    <a:lnL w="12700" cap="flat" cmpd="sng" algn="ctr">
+                      <a:solidFill>
+                        <a:schemeClr val="tx1"/>
+                      </a:solidFill>
+                      <a:prstDash val="solid"/>
+                      <a:round/>
+                      <a:headEnd type="none" w="med" len="med"/>
+                      <a:tailEnd type="none" w="med" len="med"/>
+                    </a:lnL>
+                    <a:lnR w="12700" cap="flat" cmpd="sng" algn="ctr">
+                      <a:solidFill>
+                        <a:schemeClr val="tx1"/>
+                      </a:solidFill>
+                      <a:prstDash val="solid"/>
+                      <a:round/>
+                      <a:headEnd type="none" w="med" len="med"/>
+                      <a:tailEnd type="none" w="med" len="med"/>
+                    </a:lnR>
+                    <a:lnT w="12700" cap="flat" cmpd="sng" algn="ctr">
+                      <a:solidFill>
+                        <a:schemeClr val="tx1"/>
+                      </a:solidFill>
+                      <a:prstDash val="solid"/>
+                      <a:round/>
+                      <a:headEnd type="none" w="med" len="med"/>
+                      <a:tailEnd type="none" w="med" len="med"/>
+                    </a:lnT>
+                    <a:lnB w="12700" cap="flat" cmpd="sng" algn="ctr">
+                      <a:solidFill>
+                        <a:schemeClr val="tx1"/>
+                      </a:solidFill>
+                      <a:prstDash val="solid"/>
+                      <a:round/>
+                      <a:headEnd type="none" w="med" len="med"/>
+                      <a:tailEnd type="none" w="med" len="med"/>
+                    </a:lnB>
+                    <a:noFill/>
+                  </a:tcPr>
+                </a:tc>
+              </a:tr>
+              <a:tr h="262384">
+                <a:tc>
+                  <a:txBody>
+                    <a:bodyPr/>
+                    <a:lstStyle/>
+                    <a:p>
+                      <a:r>
+                        <a:rPr lang="fr-FR" sz="1200" b="0" dirty="0" smtClean="0">
+                          <a:solidFill>
+                            <a:schemeClr val="tx1"/>
+                          </a:solidFill>
+                        </a:rPr>
+                        <a:t>9</a:t>
+                      </a:r>
+                      <a:endParaRPr lang="fr-FR" sz="1200" b="0" dirty="0">
+                        <a:solidFill>
+                          <a:schemeClr val="tx1"/>
+                        </a:solidFill>
+                      </a:endParaRPr>
+                    </a:p>
+                  </a:txBody>
+                  <a:tcPr anchor="ctr">
+                    <a:lnL w="12700" cap="flat" cmpd="sng" algn="ctr">
+                      <a:solidFill>
+                        <a:schemeClr val="tx1"/>
+                      </a:solidFill>
+                      <a:prstDash val="solid"/>
+                      <a:round/>
+                      <a:headEnd type="none" w="med" len="med"/>
+                      <a:tailEnd type="none" w="med" len="med"/>
+                    </a:lnL>
+                    <a:lnR w="12700" cap="flat" cmpd="sng" algn="ctr">
+                      <a:solidFill>
+                        <a:schemeClr val="tx1"/>
+                      </a:solidFill>
+                      <a:prstDash val="solid"/>
+                      <a:round/>
+                      <a:headEnd type="none" w="med" len="med"/>
+                      <a:tailEnd type="none" w="med" len="med"/>
+                    </a:lnR>
+                    <a:lnT w="12700" cap="flat" cmpd="sng" algn="ctr">
+                      <a:solidFill>
+                        <a:schemeClr val="tx1"/>
+                      </a:solidFill>
+                      <a:prstDash val="solid"/>
+                      <a:round/>
+                      <a:headEnd type="none" w="med" len="med"/>
+                      <a:tailEnd type="none" w="med" len="med"/>
+                    </a:lnT>
+                    <a:lnB w="12700" cap="flat" cmpd="sng" algn="ctr">
+                      <a:solidFill>
+                        <a:schemeClr val="tx1"/>
+                      </a:solidFill>
+                      <a:prstDash val="solid"/>
+                      <a:round/>
+                      <a:headEnd type="none" w="med" len="med"/>
+                      <a:tailEnd type="none" w="med" len="med"/>
+                    </a:lnB>
+                    <a:noFill/>
+                  </a:tcPr>
+                </a:tc>
+              </a:tr>
+              <a:tr h="262384">
+                <a:tc>
+                  <a:txBody>
+                    <a:bodyPr/>
+                    <a:lstStyle/>
+                    <a:p>
+                      <a:r>
+                        <a:rPr lang="fr-FR" sz="1200" b="0" dirty="0" smtClean="0">
+                          <a:solidFill>
+                            <a:schemeClr val="tx1"/>
+                          </a:solidFill>
+                        </a:rPr>
+                        <a:t>3</a:t>
+                      </a:r>
+                      <a:endParaRPr lang="fr-FR" sz="1200" b="0" dirty="0">
+                        <a:solidFill>
+                          <a:schemeClr val="tx1"/>
+                        </a:solidFill>
+                      </a:endParaRPr>
+                    </a:p>
+                  </a:txBody>
+                  <a:tcPr anchor="ctr">
+                    <a:lnL w="12700" cap="flat" cmpd="sng" algn="ctr">
+                      <a:solidFill>
+                        <a:schemeClr val="tx1"/>
+                      </a:solidFill>
+                      <a:prstDash val="solid"/>
+                      <a:round/>
+                      <a:headEnd type="none" w="med" len="med"/>
+                      <a:tailEnd type="none" w="med" len="med"/>
+                    </a:lnL>
+                    <a:lnR w="12700" cap="flat" cmpd="sng" algn="ctr">
+                      <a:solidFill>
+                        <a:schemeClr val="tx1"/>
+                      </a:solidFill>
+                      <a:prstDash val="solid"/>
+                      <a:round/>
+                      <a:headEnd type="none" w="med" len="med"/>
+                      <a:tailEnd type="none" w="med" len="med"/>
+                    </a:lnR>
+                    <a:lnT w="12700" cap="flat" cmpd="sng" algn="ctr">
+                      <a:solidFill>
+                        <a:schemeClr val="tx1"/>
+                      </a:solidFill>
+                      <a:prstDash val="solid"/>
+                      <a:round/>
+                      <a:headEnd type="none" w="med" len="med"/>
+                      <a:tailEnd type="none" w="med" len="med"/>
+                    </a:lnT>
+                    <a:lnB w="12700" cap="flat" cmpd="sng" algn="ctr">
+                      <a:solidFill>
+                        <a:schemeClr val="tx1"/>
+                      </a:solidFill>
+                      <a:prstDash val="solid"/>
+                      <a:round/>
+                      <a:headEnd type="none" w="med" len="med"/>
+                      <a:tailEnd type="none" w="med" len="med"/>
+                    </a:lnB>
+                    <a:noFill/>
+                  </a:tcPr>
+                </a:tc>
+              </a:tr>
+              <a:tr h="262384">
+                <a:tc>
+                  <a:txBody>
+                    <a:bodyPr/>
+                    <a:lstStyle/>
+                    <a:p>
+                      <a:r>
+                        <a:rPr lang="fr-FR" sz="1200" b="0" dirty="0" smtClean="0">
+                          <a:solidFill>
+                            <a:schemeClr val="tx1"/>
+                          </a:solidFill>
+                        </a:rPr>
+                        <a:t>2</a:t>
+                      </a:r>
+                      <a:endParaRPr lang="fr-FR" sz="1200" b="0" dirty="0">
+                        <a:solidFill>
+                          <a:schemeClr val="tx1"/>
+                        </a:solidFill>
+                      </a:endParaRPr>
+                    </a:p>
+                  </a:txBody>
+                  <a:tcPr anchor="ctr">
+                    <a:lnL w="12700" cap="flat" cmpd="sng" algn="ctr">
+                      <a:solidFill>
+                        <a:schemeClr val="tx1"/>
+                      </a:solidFill>
+                      <a:prstDash val="solid"/>
+                      <a:round/>
+                      <a:headEnd type="none" w="med" len="med"/>
+                      <a:tailEnd type="none" w="med" len="med"/>
+                    </a:lnL>
+                    <a:lnR w="12700" cap="flat" cmpd="sng" algn="ctr">
+                      <a:solidFill>
+                        <a:schemeClr val="tx1"/>
+                      </a:solidFill>
+                      <a:prstDash val="solid"/>
+                      <a:round/>
+                      <a:headEnd type="none" w="med" len="med"/>
+                      <a:tailEnd type="none" w="med" len="med"/>
+                    </a:lnR>
+                    <a:lnT w="12700" cap="flat" cmpd="sng" algn="ctr">
+                      <a:solidFill>
+                        <a:schemeClr val="tx1"/>
+                      </a:solidFill>
+                      <a:prstDash val="solid"/>
+                      <a:round/>
+                      <a:headEnd type="none" w="med" len="med"/>
+                      <a:tailEnd type="none" w="med" len="med"/>
+                    </a:lnT>
+                    <a:lnB w="12700" cap="flat" cmpd="sng" algn="ctr">
+                      <a:solidFill>
+                        <a:schemeClr val="tx1"/>
+                      </a:solidFill>
+                      <a:prstDash val="solid"/>
+                      <a:round/>
+                      <a:headEnd type="none" w="med" len="med"/>
+                      <a:tailEnd type="none" w="med" len="med"/>
+                    </a:lnB>
+                    <a:noFill/>
+                  </a:tcPr>
+                </a:tc>
+              </a:tr>
+              <a:tr h="262384">
+                <a:tc>
+                  <a:txBody>
+                    <a:bodyPr/>
+                    <a:lstStyle/>
+                    <a:p>
+                      <a:r>
+                        <a:rPr lang="fr-FR" sz="1200" b="0" dirty="0" smtClean="0">
+                          <a:solidFill>
+                            <a:schemeClr val="tx1"/>
+                          </a:solidFill>
+                        </a:rPr>
+                        <a:t>1</a:t>
+                      </a:r>
+                      <a:endParaRPr lang="fr-FR" sz="1200" b="0" dirty="0">
+                        <a:solidFill>
+                          <a:schemeClr val="tx1"/>
+                        </a:solidFill>
+                      </a:endParaRPr>
+                    </a:p>
+                  </a:txBody>
+                  <a:tcPr anchor="ctr">
+                    <a:lnL w="12700" cap="flat" cmpd="sng" algn="ctr">
+                      <a:solidFill>
+                        <a:schemeClr val="tx1"/>
+                      </a:solidFill>
+                      <a:prstDash val="solid"/>
+                      <a:round/>
+                      <a:headEnd type="none" w="med" len="med"/>
+                      <a:tailEnd type="none" w="med" len="med"/>
+                    </a:lnL>
+                    <a:lnR w="12700" cap="flat" cmpd="sng" algn="ctr">
+                      <a:solidFill>
+                        <a:schemeClr val="tx1"/>
+                      </a:solidFill>
+                      <a:prstDash val="solid"/>
+                      <a:round/>
+                      <a:headEnd type="none" w="med" len="med"/>
+                      <a:tailEnd type="none" w="med" len="med"/>
+                    </a:lnR>
+                    <a:lnT w="12700" cap="flat" cmpd="sng" algn="ctr">
+                      <a:solidFill>
+                        <a:schemeClr val="tx1"/>
+                      </a:solidFill>
+                      <a:prstDash val="solid"/>
+                      <a:round/>
+                      <a:headEnd type="none" w="med" len="med"/>
+                      <a:tailEnd type="none" w="med" len="med"/>
+                    </a:lnT>
+                    <a:lnB w="12700" cap="flat" cmpd="sng" algn="ctr">
+                      <a:solidFill>
+                        <a:schemeClr val="tx1"/>
+                      </a:solidFill>
+                      <a:prstDash val="solid"/>
+                      <a:round/>
+                      <a:headEnd type="none" w="med" len="med"/>
+                      <a:tailEnd type="none" w="med" len="med"/>
+                    </a:lnB>
+                    <a:noFill/>
+                  </a:tcPr>
+                </a:tc>
+              </a:tr>
+            </a:tbl>
+          </a:graphicData>
+        </a:graphic>
+      </p:graphicFrame>
+      <p:graphicFrame>
+        <p:nvGraphicFramePr>
+          <p:cNvPr id="123" name="Tableau 122"/>
+          <p:cNvGraphicFramePr>
+            <a:graphicFrameLocks noGrp="1"/>
+          </p:cNvGraphicFramePr>
+          <p:nvPr>
+            <p:extLst>
+              <p:ext uri="{D42A27DB-BD31-4B8C-83A1-F6EECF244321}">
+                <p14:modId xmlns:p14="http://schemas.microsoft.com/office/powerpoint/2010/main" val="1671169493"/>
+              </p:ext>
+            </p:extLst>
+          </p:nvPr>
+        </p:nvGraphicFramePr>
+        <p:xfrm>
+          <a:off x="7106432" y="2168860"/>
+          <a:ext cx="257200" cy="1371600"/>
+        </p:xfrm>
+        <a:graphic>
+          <a:graphicData uri="http://schemas.openxmlformats.org/drawingml/2006/table">
+            <a:tbl>
+              <a:tblPr firstRow="1" bandRow="1">
+                <a:tableStyleId>{5C22544A-7EE6-4342-B048-85BDC9FD1C3A}</a:tableStyleId>
+              </a:tblPr>
+              <a:tblGrid>
+                <a:gridCol w="257200"/>
+              </a:tblGrid>
+              <a:tr h="262384">
+                <a:tc>
+                  <a:txBody>
+                    <a:bodyPr/>
+                    <a:lstStyle/>
+                    <a:p>
+                      <a:r>
+                        <a:rPr lang="fr-FR" sz="1200" b="0" dirty="0" smtClean="0">
+                          <a:solidFill>
+                            <a:schemeClr val="tx1"/>
+                          </a:solidFill>
+                        </a:rPr>
+                        <a:t>9</a:t>
+                      </a:r>
+                      <a:endParaRPr lang="fr-FR" sz="1200" b="0" dirty="0">
+                        <a:solidFill>
+                          <a:schemeClr val="tx1"/>
+                        </a:solidFill>
+                      </a:endParaRPr>
+                    </a:p>
+                  </a:txBody>
+                  <a:tcPr anchor="ctr">
+                    <a:lnL w="12700" cap="flat" cmpd="sng" algn="ctr">
+                      <a:solidFill>
+                        <a:schemeClr val="tx1"/>
+                      </a:solidFill>
+                      <a:prstDash val="solid"/>
+                      <a:round/>
+                      <a:headEnd type="none" w="med" len="med"/>
+                      <a:tailEnd type="none" w="med" len="med"/>
+                    </a:lnL>
+                    <a:lnR w="12700" cap="flat" cmpd="sng" algn="ctr">
+                      <a:solidFill>
+                        <a:schemeClr val="tx1"/>
+                      </a:solidFill>
+                      <a:prstDash val="solid"/>
+                      <a:round/>
+                      <a:headEnd type="none" w="med" len="med"/>
+                      <a:tailEnd type="none" w="med" len="med"/>
+                    </a:lnR>
+                    <a:lnT w="12700" cap="flat" cmpd="sng" algn="ctr">
+                      <a:solidFill>
+                        <a:schemeClr val="tx1"/>
+                      </a:solidFill>
+                      <a:prstDash val="solid"/>
+                      <a:round/>
+                      <a:headEnd type="none" w="med" len="med"/>
+                      <a:tailEnd type="none" w="med" len="med"/>
+                    </a:lnT>
+                    <a:lnB w="12700" cap="flat" cmpd="sng" algn="ctr">
+                      <a:solidFill>
+                        <a:schemeClr val="tx1"/>
+                      </a:solidFill>
+                      <a:prstDash val="solid"/>
+                      <a:round/>
+                      <a:headEnd type="none" w="med" len="med"/>
+                      <a:tailEnd type="none" w="med" len="med"/>
+                    </a:lnB>
+                    <a:noFill/>
+                  </a:tcPr>
+                </a:tc>
+              </a:tr>
+              <a:tr h="262384">
+                <a:tc>
+                  <a:txBody>
+                    <a:bodyPr/>
+                    <a:lstStyle/>
+                    <a:p>
+                      <a:r>
+                        <a:rPr lang="fr-FR" sz="1200" b="0" dirty="0" smtClean="0">
+                          <a:solidFill>
+                            <a:schemeClr val="tx1"/>
+                          </a:solidFill>
+                        </a:rPr>
+                        <a:t>7</a:t>
+                      </a:r>
+                      <a:endParaRPr lang="fr-FR" sz="1200" b="0" dirty="0">
+                        <a:solidFill>
+                          <a:schemeClr val="tx1"/>
+                        </a:solidFill>
+                      </a:endParaRPr>
+                    </a:p>
+                  </a:txBody>
+                  <a:tcPr anchor="ctr">
+                    <a:lnL w="12700" cap="flat" cmpd="sng" algn="ctr">
+                      <a:solidFill>
+                        <a:schemeClr val="tx1"/>
+                      </a:solidFill>
+                      <a:prstDash val="solid"/>
+                      <a:round/>
+                      <a:headEnd type="none" w="med" len="med"/>
+                      <a:tailEnd type="none" w="med" len="med"/>
+                    </a:lnL>
+                    <a:lnR w="12700" cap="flat" cmpd="sng" algn="ctr">
+                      <a:solidFill>
+                        <a:schemeClr val="tx1"/>
+                      </a:solidFill>
+                      <a:prstDash val="solid"/>
+                      <a:round/>
+                      <a:headEnd type="none" w="med" len="med"/>
+                      <a:tailEnd type="none" w="med" len="med"/>
+                    </a:lnR>
+                    <a:lnT w="12700" cap="flat" cmpd="sng" algn="ctr">
+                      <a:solidFill>
+                        <a:schemeClr val="tx1"/>
+                      </a:solidFill>
+                      <a:prstDash val="solid"/>
+                      <a:round/>
+                      <a:headEnd type="none" w="med" len="med"/>
+                      <a:tailEnd type="none" w="med" len="med"/>
+                    </a:lnT>
+                    <a:lnB w="12700" cap="flat" cmpd="sng" algn="ctr">
+                      <a:solidFill>
+                        <a:schemeClr val="tx1"/>
+                      </a:solidFill>
+                      <a:prstDash val="solid"/>
+                      <a:round/>
+                      <a:headEnd type="none" w="med" len="med"/>
+                      <a:tailEnd type="none" w="med" len="med"/>
+                    </a:lnB>
+                    <a:noFill/>
+                  </a:tcPr>
+                </a:tc>
+              </a:tr>
+              <a:tr h="262384">
+                <a:tc>
+                  <a:txBody>
+                    <a:bodyPr/>
+                    <a:lstStyle/>
+                    <a:p>
+                      <a:r>
+                        <a:rPr lang="fr-FR" sz="1200" b="0" dirty="0" smtClean="0">
+                          <a:solidFill>
+                            <a:schemeClr val="tx1"/>
+                          </a:solidFill>
+                        </a:rPr>
+                        <a:t>3</a:t>
+                      </a:r>
+                      <a:endParaRPr lang="fr-FR" sz="1200" b="0" dirty="0">
+                        <a:solidFill>
+                          <a:schemeClr val="tx1"/>
+                        </a:solidFill>
+                      </a:endParaRPr>
+                    </a:p>
+                  </a:txBody>
+                  <a:tcPr anchor="ctr">
+                    <a:lnL w="12700" cap="flat" cmpd="sng" algn="ctr">
+                      <a:solidFill>
+                        <a:schemeClr val="tx1"/>
+                      </a:solidFill>
+                      <a:prstDash val="solid"/>
+                      <a:round/>
+                      <a:headEnd type="none" w="med" len="med"/>
+                      <a:tailEnd type="none" w="med" len="med"/>
+                    </a:lnL>
+                    <a:lnR w="12700" cap="flat" cmpd="sng" algn="ctr">
+                      <a:solidFill>
+                        <a:schemeClr val="tx1"/>
+                      </a:solidFill>
+                      <a:prstDash val="solid"/>
+                      <a:round/>
+                      <a:headEnd type="none" w="med" len="med"/>
+                      <a:tailEnd type="none" w="med" len="med"/>
+                    </a:lnR>
+                    <a:lnT w="12700" cap="flat" cmpd="sng" algn="ctr">
+                      <a:solidFill>
+                        <a:schemeClr val="tx1"/>
+                      </a:solidFill>
+                      <a:prstDash val="solid"/>
+                      <a:round/>
+                      <a:headEnd type="none" w="med" len="med"/>
+                      <a:tailEnd type="none" w="med" len="med"/>
+                    </a:lnT>
+                    <a:lnB w="12700" cap="flat" cmpd="sng" algn="ctr">
+                      <a:solidFill>
+                        <a:schemeClr val="tx1"/>
+                      </a:solidFill>
+                      <a:prstDash val="solid"/>
+                      <a:round/>
+                      <a:headEnd type="none" w="med" len="med"/>
+                      <a:tailEnd type="none" w="med" len="med"/>
+                    </a:lnB>
+                    <a:noFill/>
+                  </a:tcPr>
+                </a:tc>
+              </a:tr>
+              <a:tr h="262384">
+                <a:tc>
+                  <a:txBody>
+                    <a:bodyPr/>
+                    <a:lstStyle/>
+                    <a:p>
+                      <a:r>
+                        <a:rPr lang="fr-FR" sz="1200" b="0" dirty="0" smtClean="0">
+                          <a:solidFill>
+                            <a:schemeClr val="tx1"/>
+                          </a:solidFill>
+                        </a:rPr>
+                        <a:t>2</a:t>
+                      </a:r>
+                      <a:endParaRPr lang="fr-FR" sz="1200" b="0" dirty="0">
+                        <a:solidFill>
+                          <a:schemeClr val="tx1"/>
+                        </a:solidFill>
+                      </a:endParaRPr>
+                    </a:p>
+                  </a:txBody>
+                  <a:tcPr anchor="ctr">
+                    <a:lnL w="12700" cap="flat" cmpd="sng" algn="ctr">
+                      <a:solidFill>
+                        <a:schemeClr val="tx1"/>
+                      </a:solidFill>
+                      <a:prstDash val="solid"/>
+                      <a:round/>
+                      <a:headEnd type="none" w="med" len="med"/>
+                      <a:tailEnd type="none" w="med" len="med"/>
+                    </a:lnL>
+                    <a:lnR w="12700" cap="flat" cmpd="sng" algn="ctr">
+                      <a:solidFill>
+                        <a:schemeClr val="tx1"/>
+                      </a:solidFill>
+                      <a:prstDash val="solid"/>
+                      <a:round/>
+                      <a:headEnd type="none" w="med" len="med"/>
+                      <a:tailEnd type="none" w="med" len="med"/>
+                    </a:lnR>
+                    <a:lnT w="12700" cap="flat" cmpd="sng" algn="ctr">
+                      <a:solidFill>
+                        <a:schemeClr val="tx1"/>
+                      </a:solidFill>
+                      <a:prstDash val="solid"/>
+                      <a:round/>
+                      <a:headEnd type="none" w="med" len="med"/>
+                      <a:tailEnd type="none" w="med" len="med"/>
+                    </a:lnT>
+                    <a:lnB w="12700" cap="flat" cmpd="sng" algn="ctr">
+                      <a:solidFill>
+                        <a:schemeClr val="tx1"/>
+                      </a:solidFill>
+                      <a:prstDash val="solid"/>
+                      <a:round/>
+                      <a:headEnd type="none" w="med" len="med"/>
+                      <a:tailEnd type="none" w="med" len="med"/>
+                    </a:lnB>
+                    <a:noFill/>
+                  </a:tcPr>
+                </a:tc>
+              </a:tr>
+              <a:tr h="262384">
+                <a:tc>
+                  <a:txBody>
+                    <a:bodyPr/>
+                    <a:lstStyle/>
+                    <a:p>
+                      <a:r>
+                        <a:rPr lang="fr-FR" sz="1200" b="0" dirty="0" smtClean="0">
+                          <a:solidFill>
+                            <a:schemeClr val="tx1"/>
+                          </a:solidFill>
+                        </a:rPr>
+                        <a:t>1</a:t>
+                      </a:r>
+                      <a:endParaRPr lang="fr-FR" sz="1200" b="0" dirty="0">
+                        <a:solidFill>
+                          <a:schemeClr val="tx1"/>
+                        </a:solidFill>
+                      </a:endParaRPr>
+                    </a:p>
+                  </a:txBody>
+                  <a:tcPr anchor="ctr">
+                    <a:lnL w="12700" cap="flat" cmpd="sng" algn="ctr">
+                      <a:solidFill>
+                        <a:schemeClr val="tx1"/>
+                      </a:solidFill>
+                      <a:prstDash val="solid"/>
+                      <a:round/>
+                      <a:headEnd type="none" w="med" len="med"/>
+                      <a:tailEnd type="none" w="med" len="med"/>
+                    </a:lnL>
+                    <a:lnR w="12700" cap="flat" cmpd="sng" algn="ctr">
+                      <a:solidFill>
+                        <a:schemeClr val="tx1"/>
+                      </a:solidFill>
+                      <a:prstDash val="solid"/>
+                      <a:round/>
+                      <a:headEnd type="none" w="med" len="med"/>
+                      <a:tailEnd type="none" w="med" len="med"/>
+                    </a:lnR>
+                    <a:lnT w="12700" cap="flat" cmpd="sng" algn="ctr">
+                      <a:solidFill>
+                        <a:schemeClr val="tx1"/>
+                      </a:solidFill>
+                      <a:prstDash val="solid"/>
+                      <a:round/>
+                      <a:headEnd type="none" w="med" len="med"/>
+                      <a:tailEnd type="none" w="med" len="med"/>
+                    </a:lnT>
+                    <a:lnB w="12700" cap="flat" cmpd="sng" algn="ctr">
+                      <a:solidFill>
+                        <a:schemeClr val="tx1"/>
+                      </a:solidFill>
+                      <a:prstDash val="solid"/>
+                      <a:round/>
+                      <a:headEnd type="none" w="med" len="med"/>
+                      <a:tailEnd type="none" w="med" len="med"/>
+                    </a:lnB>
+                    <a:noFill/>
+                  </a:tcPr>
+                </a:tc>
+              </a:tr>
+            </a:tbl>
+          </a:graphicData>
+        </a:graphic>
+      </p:graphicFrame>
+      <p:cxnSp>
+        <p:nvCxnSpPr>
+          <p:cNvPr id="125" name="Connecteur droit 124"/>
+          <p:cNvCxnSpPr/>
+          <p:nvPr/>
+        </p:nvCxnSpPr>
+        <p:spPr>
+          <a:xfrm>
+            <a:off x="1664000" y="3429000"/>
+            <a:ext cx="360000" cy="0"/>
+          </a:xfrm>
+          <a:prstGeom prst="line">
+            <a:avLst/>
+          </a:prstGeom>
+          <a:ln w="19050">
+            <a:solidFill>
+              <a:srgbClr val="002060"/>
+            </a:solidFill>
+          </a:ln>
+        </p:spPr>
+        <p:style>
+          <a:lnRef idx="1">
+            <a:schemeClr val="accent1"/>
+          </a:lnRef>
+          <a:fillRef idx="0">
+            <a:schemeClr val="accent1"/>
+          </a:fillRef>
+          <a:effectRef idx="0">
+            <a:schemeClr val="accent1"/>
+          </a:effectRef>
+          <a:fontRef idx="minor">
+            <a:schemeClr val="tx1"/>
+          </a:fontRef>
+        </p:style>
+      </p:cxnSp>
+      <p:cxnSp>
+        <p:nvCxnSpPr>
+          <p:cNvPr id="128" name="Connecteur droit 127"/>
+          <p:cNvCxnSpPr/>
+          <p:nvPr/>
+        </p:nvCxnSpPr>
+        <p:spPr>
+          <a:xfrm>
+            <a:off x="1679312" y="2587938"/>
+            <a:ext cx="360000" cy="0"/>
+          </a:xfrm>
+          <a:prstGeom prst="line">
+            <a:avLst/>
+          </a:prstGeom>
+          <a:ln w="19050">
+            <a:solidFill>
+              <a:srgbClr val="002060"/>
+            </a:solidFill>
+          </a:ln>
+        </p:spPr>
+        <p:style>
+          <a:lnRef idx="1">
+            <a:schemeClr val="accent1"/>
+          </a:lnRef>
+          <a:fillRef idx="0">
+            <a:schemeClr val="accent1"/>
+          </a:fillRef>
+          <a:effectRef idx="0">
+            <a:schemeClr val="accent1"/>
+          </a:effectRef>
+          <a:fontRef idx="minor">
+            <a:schemeClr val="tx1"/>
+          </a:fontRef>
+        </p:style>
+      </p:cxnSp>
+      <p:cxnSp>
+        <p:nvCxnSpPr>
+          <p:cNvPr id="129" name="Connecteur droit 128"/>
+          <p:cNvCxnSpPr/>
+          <p:nvPr/>
+        </p:nvCxnSpPr>
+        <p:spPr>
+          <a:xfrm>
+            <a:off x="2490958" y="2587938"/>
+            <a:ext cx="360000" cy="0"/>
+          </a:xfrm>
+          <a:prstGeom prst="line">
+            <a:avLst/>
+          </a:prstGeom>
+          <a:ln w="19050">
+            <a:solidFill>
+              <a:srgbClr val="002060"/>
+            </a:solidFill>
+            <a:tailEnd type="stealth" w="med" len="lg"/>
+          </a:ln>
+        </p:spPr>
+        <p:style>
+          <a:lnRef idx="1">
+            <a:schemeClr val="accent1"/>
+          </a:lnRef>
+          <a:fillRef idx="0">
+            <a:schemeClr val="accent1"/>
+          </a:fillRef>
+          <a:effectRef idx="0">
+            <a:schemeClr val="accent1"/>
+          </a:effectRef>
+          <a:fontRef idx="minor">
+            <a:schemeClr val="tx1"/>
+          </a:fontRef>
+        </p:style>
+      </p:cxnSp>
+      <p:cxnSp>
+        <p:nvCxnSpPr>
+          <p:cNvPr id="130" name="Connecteur droit 129"/>
+          <p:cNvCxnSpPr/>
+          <p:nvPr/>
+        </p:nvCxnSpPr>
+        <p:spPr>
+          <a:xfrm>
+            <a:off x="2483758" y="3409817"/>
+            <a:ext cx="360000" cy="0"/>
+          </a:xfrm>
+          <a:prstGeom prst="line">
+            <a:avLst/>
+          </a:prstGeom>
+          <a:ln w="19050">
+            <a:solidFill>
+              <a:srgbClr val="002060"/>
+            </a:solidFill>
+            <a:tailEnd type="stealth" w="med" len="lg"/>
+          </a:ln>
+        </p:spPr>
+        <p:style>
+          <a:lnRef idx="1">
+            <a:schemeClr val="accent1"/>
+          </a:lnRef>
+          <a:fillRef idx="0">
+            <a:schemeClr val="accent1"/>
+          </a:fillRef>
+          <a:effectRef idx="0">
+            <a:schemeClr val="accent1"/>
+          </a:effectRef>
+          <a:fontRef idx="minor">
+            <a:schemeClr val="tx1"/>
+          </a:fontRef>
+        </p:style>
+      </p:cxnSp>
+      <p:cxnSp>
+        <p:nvCxnSpPr>
+          <p:cNvPr id="131" name="Connecteur droit 130"/>
+          <p:cNvCxnSpPr/>
+          <p:nvPr/>
+        </p:nvCxnSpPr>
+        <p:spPr>
+          <a:xfrm flipH="1" flipV="1">
+            <a:off x="2039312" y="2585458"/>
+            <a:ext cx="444446" cy="824362"/>
+          </a:xfrm>
+          <a:prstGeom prst="line">
+            <a:avLst/>
+          </a:prstGeom>
+          <a:ln w="19050">
+            <a:solidFill>
+              <a:srgbClr val="002060"/>
+            </a:solidFill>
+          </a:ln>
+        </p:spPr>
+        <p:style>
+          <a:lnRef idx="1">
+            <a:schemeClr val="accent1"/>
+          </a:lnRef>
+          <a:fillRef idx="0">
+            <a:schemeClr val="accent1"/>
+          </a:fillRef>
+          <a:effectRef idx="0">
+            <a:schemeClr val="accent1"/>
+          </a:effectRef>
+          <a:fontRef idx="minor">
+            <a:schemeClr val="tx1"/>
+          </a:fontRef>
+        </p:style>
+      </p:cxnSp>
+      <p:cxnSp>
+        <p:nvCxnSpPr>
+          <p:cNvPr id="134" name="Connecteur droit 133"/>
+          <p:cNvCxnSpPr/>
+          <p:nvPr/>
+        </p:nvCxnSpPr>
+        <p:spPr>
+          <a:xfrm flipH="1">
+            <a:off x="2024000" y="2585458"/>
+            <a:ext cx="466958" cy="843542"/>
+          </a:xfrm>
+          <a:prstGeom prst="line">
+            <a:avLst/>
+          </a:prstGeom>
+          <a:ln w="19050">
+            <a:solidFill>
+              <a:srgbClr val="002060"/>
+            </a:solidFill>
+          </a:ln>
+        </p:spPr>
+        <p:style>
+          <a:lnRef idx="1">
+            <a:schemeClr val="accent1"/>
+          </a:lnRef>
+          <a:fillRef idx="0">
+            <a:schemeClr val="accent1"/>
+          </a:fillRef>
+          <a:effectRef idx="0">
+            <a:schemeClr val="accent1"/>
+          </a:effectRef>
+          <a:fontRef idx="minor">
+            <a:schemeClr val="tx1"/>
+          </a:fontRef>
+        </p:style>
+      </p:cxnSp>
+      <p:cxnSp>
+        <p:nvCxnSpPr>
+          <p:cNvPr id="141" name="Connecteur droit 140"/>
+          <p:cNvCxnSpPr/>
+          <p:nvPr/>
+        </p:nvCxnSpPr>
+        <p:spPr>
+          <a:xfrm>
+            <a:off x="3099641" y="3140968"/>
+            <a:ext cx="360000" cy="0"/>
+          </a:xfrm>
+          <a:prstGeom prst="line">
+            <a:avLst/>
+          </a:prstGeom>
+          <a:ln w="19050">
+            <a:solidFill>
+              <a:srgbClr val="002060"/>
+            </a:solidFill>
+          </a:ln>
+        </p:spPr>
+        <p:style>
+          <a:lnRef idx="1">
+            <a:schemeClr val="accent1"/>
+          </a:lnRef>
+          <a:fillRef idx="0">
+            <a:schemeClr val="accent1"/>
+          </a:fillRef>
+          <a:effectRef idx="0">
+            <a:schemeClr val="accent1"/>
+          </a:effectRef>
+          <a:fontRef idx="minor">
+            <a:schemeClr val="tx1"/>
+          </a:fontRef>
+        </p:style>
+      </p:cxnSp>
+      <p:cxnSp>
+        <p:nvCxnSpPr>
+          <p:cNvPr id="142" name="Connecteur droit 141"/>
+          <p:cNvCxnSpPr/>
+          <p:nvPr/>
+        </p:nvCxnSpPr>
+        <p:spPr>
+          <a:xfrm>
+            <a:off x="3093358" y="2285817"/>
+            <a:ext cx="360000" cy="0"/>
+          </a:xfrm>
+          <a:prstGeom prst="line">
+            <a:avLst/>
+          </a:prstGeom>
+          <a:ln w="19050">
+            <a:solidFill>
+              <a:srgbClr val="002060"/>
+            </a:solidFill>
+          </a:ln>
+        </p:spPr>
+        <p:style>
+          <a:lnRef idx="1">
+            <a:schemeClr val="accent1"/>
+          </a:lnRef>
+          <a:fillRef idx="0">
+            <a:schemeClr val="accent1"/>
+          </a:fillRef>
+          <a:effectRef idx="0">
+            <a:schemeClr val="accent1"/>
+          </a:effectRef>
+          <a:fontRef idx="minor">
+            <a:schemeClr val="tx1"/>
+          </a:fontRef>
+        </p:style>
+      </p:cxnSp>
+      <p:cxnSp>
+        <p:nvCxnSpPr>
+          <p:cNvPr id="149" name="Connecteur droit 148"/>
+          <p:cNvCxnSpPr/>
+          <p:nvPr/>
+        </p:nvCxnSpPr>
+        <p:spPr>
+          <a:xfrm>
+            <a:off x="3905916" y="2314590"/>
+            <a:ext cx="360000" cy="0"/>
+          </a:xfrm>
+          <a:prstGeom prst="line">
+            <a:avLst/>
+          </a:prstGeom>
+          <a:ln w="19050">
+            <a:solidFill>
+              <a:srgbClr val="002060"/>
+            </a:solidFill>
+            <a:tailEnd type="stealth" w="med" len="lg"/>
+          </a:ln>
+        </p:spPr>
+        <p:style>
+          <a:lnRef idx="1">
+            <a:schemeClr val="accent1"/>
+          </a:lnRef>
+          <a:fillRef idx="0">
+            <a:schemeClr val="accent1"/>
+          </a:fillRef>
+          <a:effectRef idx="0">
+            <a:schemeClr val="accent1"/>
+          </a:effectRef>
+          <a:fontRef idx="minor">
+            <a:schemeClr val="tx1"/>
+          </a:fontRef>
+        </p:style>
+      </p:cxnSp>
+      <p:cxnSp>
+        <p:nvCxnSpPr>
+          <p:cNvPr id="155" name="Connecteur droit 154"/>
+          <p:cNvCxnSpPr/>
+          <p:nvPr/>
+        </p:nvCxnSpPr>
+        <p:spPr>
+          <a:xfrm>
+            <a:off x="3905916" y="3136484"/>
+            <a:ext cx="360000" cy="0"/>
+          </a:xfrm>
+          <a:prstGeom prst="line">
+            <a:avLst/>
+          </a:prstGeom>
+          <a:ln w="19050">
+            <a:solidFill>
+              <a:srgbClr val="002060"/>
+            </a:solidFill>
+            <a:tailEnd type="stealth" w="med" len="lg"/>
+          </a:ln>
+        </p:spPr>
+        <p:style>
+          <a:lnRef idx="1">
+            <a:schemeClr val="accent1"/>
+          </a:lnRef>
+          <a:fillRef idx="0">
+            <a:schemeClr val="accent1"/>
+          </a:fillRef>
+          <a:effectRef idx="0">
+            <a:schemeClr val="accent1"/>
+          </a:effectRef>
+          <a:fontRef idx="minor">
+            <a:schemeClr val="tx1"/>
+          </a:fontRef>
+        </p:style>
+      </p:cxnSp>
+      <p:cxnSp>
+        <p:nvCxnSpPr>
+          <p:cNvPr id="157" name="Connecteur droit 156"/>
+          <p:cNvCxnSpPr>
+            <a:stCxn id="121" idx="3"/>
+            <a:endCxn id="122" idx="1"/>
+          </p:cNvCxnSpPr>
+          <p:nvPr/>
+        </p:nvCxnSpPr>
+        <p:spPr>
+          <a:xfrm>
+            <a:off x="4519316" y="2854660"/>
+            <a:ext cx="1164958" cy="0"/>
+          </a:xfrm>
+          <a:prstGeom prst="line">
+            <a:avLst/>
+          </a:prstGeom>
+          <a:ln w="19050">
+            <a:solidFill>
+              <a:srgbClr val="002060"/>
+            </a:solidFill>
+            <a:tailEnd type="stealth" w="med" len="lg"/>
+          </a:ln>
+        </p:spPr>
+        <p:style>
+          <a:lnRef idx="1">
+            <a:schemeClr val="accent1"/>
+          </a:lnRef>
+          <a:fillRef idx="0">
+            <a:schemeClr val="accent1"/>
+          </a:fillRef>
+          <a:effectRef idx="0">
+            <a:schemeClr val="accent1"/>
+          </a:effectRef>
+          <a:fontRef idx="minor">
+            <a:schemeClr val="tx1"/>
+          </a:fontRef>
+        </p:style>
+      </p:cxnSp>
+      <p:cxnSp>
+        <p:nvCxnSpPr>
+          <p:cNvPr id="160" name="Connecteur droit 159"/>
+          <p:cNvCxnSpPr/>
+          <p:nvPr/>
+        </p:nvCxnSpPr>
+        <p:spPr>
+          <a:xfrm>
+            <a:off x="3453358" y="2276872"/>
+            <a:ext cx="452558" cy="859810"/>
+          </a:xfrm>
+          <a:prstGeom prst="line">
+            <a:avLst/>
+          </a:prstGeom>
+          <a:ln w="19050">
+            <a:solidFill>
+              <a:srgbClr val="002060"/>
+            </a:solidFill>
+          </a:ln>
+        </p:spPr>
+        <p:style>
+          <a:lnRef idx="1">
+            <a:schemeClr val="accent1"/>
+          </a:lnRef>
+          <a:fillRef idx="0">
+            <a:schemeClr val="accent1"/>
+          </a:fillRef>
+          <a:effectRef idx="0">
+            <a:schemeClr val="accent1"/>
+          </a:effectRef>
+          <a:fontRef idx="minor">
+            <a:schemeClr val="tx1"/>
+          </a:fontRef>
+        </p:style>
+      </p:cxnSp>
+      <p:cxnSp>
+        <p:nvCxnSpPr>
+          <p:cNvPr id="163" name="Connecteur droit 162"/>
+          <p:cNvCxnSpPr/>
+          <p:nvPr/>
+        </p:nvCxnSpPr>
+        <p:spPr>
+          <a:xfrm flipV="1">
+            <a:off x="3459641" y="2314590"/>
+            <a:ext cx="446275" cy="826379"/>
+          </a:xfrm>
+          <a:prstGeom prst="line">
+            <a:avLst/>
+          </a:prstGeom>
+          <a:ln w="19050">
+            <a:solidFill>
+              <a:srgbClr val="002060"/>
+            </a:solidFill>
+          </a:ln>
+        </p:spPr>
+        <p:style>
+          <a:lnRef idx="1">
+            <a:schemeClr val="accent1"/>
+          </a:lnRef>
+          <a:fillRef idx="0">
+            <a:schemeClr val="accent1"/>
+          </a:fillRef>
+          <a:effectRef idx="0">
+            <a:schemeClr val="accent1"/>
+          </a:effectRef>
+          <a:fontRef idx="minor">
+            <a:schemeClr val="tx1"/>
+          </a:fontRef>
+        </p:style>
+      </p:cxnSp>
+      <p:cxnSp>
+        <p:nvCxnSpPr>
+          <p:cNvPr id="184" name="Connecteur droit 183"/>
+          <p:cNvCxnSpPr/>
+          <p:nvPr/>
+        </p:nvCxnSpPr>
+        <p:spPr>
+          <a:xfrm>
+            <a:off x="6750232" y="2585458"/>
+            <a:ext cx="360000" cy="0"/>
+          </a:xfrm>
+          <a:prstGeom prst="line">
+            <a:avLst/>
+          </a:prstGeom>
+          <a:ln w="19050">
+            <a:solidFill>
+              <a:srgbClr val="002060"/>
+            </a:solidFill>
+            <a:tailEnd type="stealth" w="med" len="lg"/>
+          </a:ln>
+        </p:spPr>
+        <p:style>
+          <a:lnRef idx="1">
+            <a:schemeClr val="accent1"/>
+          </a:lnRef>
+          <a:fillRef idx="0">
+            <a:schemeClr val="accent1"/>
+          </a:fillRef>
+          <a:effectRef idx="0">
+            <a:schemeClr val="accent1"/>
+          </a:effectRef>
+          <a:fontRef idx="minor">
+            <a:schemeClr val="tx1"/>
+          </a:fontRef>
+        </p:style>
+      </p:cxnSp>
+      <p:cxnSp>
+        <p:nvCxnSpPr>
+          <p:cNvPr id="185" name="Connecteur droit 184"/>
+          <p:cNvCxnSpPr/>
+          <p:nvPr/>
+        </p:nvCxnSpPr>
+        <p:spPr>
+          <a:xfrm>
+            <a:off x="5943957" y="2585458"/>
+            <a:ext cx="360000" cy="0"/>
+          </a:xfrm>
+          <a:prstGeom prst="line">
+            <a:avLst/>
+          </a:prstGeom>
+          <a:ln w="19050">
+            <a:solidFill>
+              <a:srgbClr val="002060"/>
+            </a:solidFill>
+          </a:ln>
+        </p:spPr>
+        <p:style>
+          <a:lnRef idx="1">
+            <a:schemeClr val="accent1"/>
+          </a:lnRef>
+          <a:fillRef idx="0">
+            <a:schemeClr val="accent1"/>
+          </a:fillRef>
+          <a:effectRef idx="0">
+            <a:schemeClr val="accent1"/>
+          </a:effectRef>
+          <a:fontRef idx="minor">
+            <a:schemeClr val="tx1"/>
+          </a:fontRef>
+        </p:style>
+      </p:cxnSp>
+      <p:cxnSp>
+        <p:nvCxnSpPr>
+          <p:cNvPr id="190" name="Connecteur droit 189"/>
+          <p:cNvCxnSpPr/>
+          <p:nvPr/>
+        </p:nvCxnSpPr>
+        <p:spPr>
+          <a:xfrm flipV="1">
+            <a:off x="6303957" y="2276872"/>
+            <a:ext cx="446275" cy="308586"/>
+          </a:xfrm>
+          <a:prstGeom prst="line">
+            <a:avLst/>
+          </a:prstGeom>
+          <a:ln w="19050">
+            <a:solidFill>
+              <a:srgbClr val="002060"/>
+            </a:solidFill>
+          </a:ln>
+        </p:spPr>
+        <p:style>
+          <a:lnRef idx="1">
+            <a:schemeClr val="accent1"/>
+          </a:lnRef>
+          <a:fillRef idx="0">
+            <a:schemeClr val="accent1"/>
+          </a:fillRef>
+          <a:effectRef idx="0">
+            <a:schemeClr val="accent1"/>
+          </a:effectRef>
+          <a:fontRef idx="minor">
+            <a:schemeClr val="tx1"/>
+          </a:fontRef>
+        </p:style>
+      </p:cxnSp>
+      <p:cxnSp>
+        <p:nvCxnSpPr>
+          <p:cNvPr id="192" name="Connecteur droit 191"/>
+          <p:cNvCxnSpPr/>
+          <p:nvPr/>
+        </p:nvCxnSpPr>
+        <p:spPr>
+          <a:xfrm>
+            <a:off x="6297674" y="2276872"/>
+            <a:ext cx="453722" cy="308586"/>
+          </a:xfrm>
+          <a:prstGeom prst="line">
+            <a:avLst/>
+          </a:prstGeom>
+          <a:ln w="19050">
+            <a:solidFill>
+              <a:srgbClr val="002060"/>
+            </a:solidFill>
+          </a:ln>
+        </p:spPr>
+        <p:style>
+          <a:lnRef idx="1">
+            <a:schemeClr val="accent1"/>
+          </a:lnRef>
+          <a:fillRef idx="0">
+            <a:schemeClr val="accent1"/>
+          </a:fillRef>
+          <a:effectRef idx="0">
+            <a:schemeClr val="accent1"/>
+          </a:effectRef>
+          <a:fontRef idx="minor">
+            <a:schemeClr val="tx1"/>
+          </a:fontRef>
+        </p:style>
+      </p:cxnSp>
+      <p:cxnSp>
+        <p:nvCxnSpPr>
+          <p:cNvPr id="193" name="Connecteur droit 192"/>
+          <p:cNvCxnSpPr/>
+          <p:nvPr/>
+        </p:nvCxnSpPr>
+        <p:spPr>
+          <a:xfrm>
+            <a:off x="5937674" y="2276872"/>
+            <a:ext cx="360000" cy="0"/>
+          </a:xfrm>
+          <a:prstGeom prst="line">
+            <a:avLst/>
+          </a:prstGeom>
+          <a:ln w="19050">
+            <a:solidFill>
+              <a:srgbClr val="002060"/>
+            </a:solidFill>
+          </a:ln>
+        </p:spPr>
+        <p:style>
+          <a:lnRef idx="1">
+            <a:schemeClr val="accent1"/>
+          </a:lnRef>
+          <a:fillRef idx="0">
+            <a:schemeClr val="accent1"/>
+          </a:fillRef>
+          <a:effectRef idx="0">
+            <a:schemeClr val="accent1"/>
+          </a:effectRef>
+          <a:fontRef idx="minor">
+            <a:schemeClr val="tx1"/>
+          </a:fontRef>
+        </p:style>
+      </p:cxnSp>
+      <p:cxnSp>
+        <p:nvCxnSpPr>
+          <p:cNvPr id="194" name="Connecteur droit 193"/>
+          <p:cNvCxnSpPr/>
+          <p:nvPr/>
+        </p:nvCxnSpPr>
+        <p:spPr>
+          <a:xfrm>
+            <a:off x="6750232" y="2285817"/>
+            <a:ext cx="360000" cy="0"/>
+          </a:xfrm>
+          <a:prstGeom prst="line">
+            <a:avLst/>
+          </a:prstGeom>
+          <a:ln w="19050">
+            <a:solidFill>
+              <a:srgbClr val="002060"/>
+            </a:solidFill>
+            <a:tailEnd type="stealth" w="med" len="lg"/>
+          </a:ln>
+        </p:spPr>
+        <p:style>
+          <a:lnRef idx="1">
+            <a:schemeClr val="accent1"/>
+          </a:lnRef>
+          <a:fillRef idx="0">
+            <a:schemeClr val="accent1"/>
+          </a:fillRef>
+          <a:effectRef idx="0">
+            <a:schemeClr val="accent1"/>
+          </a:effectRef>
+          <a:fontRef idx="minor">
+            <a:schemeClr val="tx1"/>
+          </a:fontRef>
+        </p:style>
+      </p:cxnSp>
+      <p:cxnSp>
+        <p:nvCxnSpPr>
+          <p:cNvPr id="132" name="Connecteur droit 131"/>
+          <p:cNvCxnSpPr/>
+          <p:nvPr/>
+        </p:nvCxnSpPr>
+        <p:spPr>
+          <a:xfrm flipV="1">
+            <a:off x="1034000" y="2204864"/>
+            <a:ext cx="0" cy="1296144"/>
+          </a:xfrm>
+          <a:prstGeom prst="line">
+            <a:avLst/>
+          </a:prstGeom>
+          <a:ln w="19050">
+            <a:solidFill>
+              <a:srgbClr val="002060"/>
+            </a:solidFill>
+            <a:tailEnd type="stealth" w="med" len="lg"/>
+          </a:ln>
+        </p:spPr>
+        <p:style>
+          <a:lnRef idx="1">
+            <a:schemeClr val="accent1"/>
+          </a:lnRef>
+          <a:fillRef idx="0">
+            <a:schemeClr val="accent1"/>
+          </a:fillRef>
+          <a:effectRef idx="0">
+            <a:schemeClr val="accent1"/>
+          </a:effectRef>
+          <a:fontRef idx="minor">
+            <a:schemeClr val="tx1"/>
+          </a:fontRef>
+        </p:style>
+      </p:cxnSp>
+      <p:sp>
+        <p:nvSpPr>
+          <p:cNvPr id="133" name="ZoneTexte 132"/>
+          <p:cNvSpPr txBox="1"/>
+          <p:nvPr/>
+        </p:nvSpPr>
+        <p:spPr>
+          <a:xfrm rot="16200000">
+            <a:off x="275350" y="2737520"/>
+            <a:ext cx="1296144" cy="230832"/>
+          </a:xfrm>
+          <a:prstGeom prst="rect">
+            <a:avLst/>
+          </a:prstGeom>
+          <a:noFill/>
+        </p:spPr>
+        <p:txBody>
+          <a:bodyPr wrap="square" rtlCol="0">
+            <a:spAutoFit/>
+          </a:bodyPr>
+          <a:lstStyle/>
+          <a:p>
+            <a:pPr algn="ctr"/>
+            <a:r>
+              <a:rPr lang="fr-FR" sz="900" dirty="0" smtClean="0"/>
+              <a:t>Sens croissant</a:t>
+            </a:r>
+            <a:endParaRPr lang="fr-FR" sz="900" dirty="0"/>
+          </a:p>
+        </p:txBody>
+      </p:sp>
+    </p:spTree>
+    <p:extLst>
+      <p:ext uri="{BB962C8B-B14F-4D97-AF65-F5344CB8AC3E}">
+        <p14:creationId xmlns:p14="http://schemas.microsoft.com/office/powerpoint/2010/main" val="248316896"/>
       </p:ext>
     </p:extLst>
   </p:cSld>

</xml_diff>